<commit_message>
Edited Presentation and Rearranged Files
</commit_message>
<xml_diff>
--- a/challenge#5/Challenge5_Group4.pptx
+++ b/challenge#5/Challenge5_Group4.pptx
@@ -114,7 +114,7 @@
   </p:defaultTextStyle>
   <p:extLst>
     <p:ext uri="{EFAFB233-063F-42B5-8137-9DF3F51BA10A}">
-      <p15:sldGuideLst xmlns:p15="http://schemas.microsoft.com/office/powerpoint/2012/main" xmlns="">
+      <p15:sldGuideLst xmlns:p15="http://schemas.microsoft.com/office/powerpoint/2012/main">
         <p15:guide id="1" orient="horz" pos="2160">
           <p15:clr>
             <a:srgbClr val="A4A3A4"/>
@@ -214,7 +214,7 @@
             <a:fld id="{7C192746-61B6-4906-A888-BD859954706E}" type="datetimeFigureOut">
               <a:rPr lang="en-US" smtClean="0"/>
               <a:pPr/>
-              <a:t>11/11/2015</a:t>
+              <a:t>11/12/2015</a:t>
             </a:fld>
             <a:endParaRPr lang="en-US"/>
           </a:p>
@@ -383,7 +383,7 @@
     </p:spTree>
     <p:extLst>
       <p:ext uri="{BB962C8B-B14F-4D97-AF65-F5344CB8AC3E}">
-        <p14:creationId xmlns:p14="http://schemas.microsoft.com/office/powerpoint/2010/main" xmlns="" val="3319504501"/>
+        <p14:creationId xmlns:p14="http://schemas.microsoft.com/office/powerpoint/2010/main" val="3319504501"/>
       </p:ext>
     </p:extLst>
   </p:cSld>
@@ -855,7 +855,7 @@
             <a:fld id="{B1115196-1C6F-4784-83AC-30756D8F10B3}" type="datetimeFigureOut">
               <a:rPr lang="en-US" smtClean="0"/>
               <a:pPr/>
-              <a:t>11/11/2015</a:t>
+              <a:t>11/12/2015</a:t>
             </a:fld>
             <a:endParaRPr lang="en-US"/>
           </a:p>
@@ -1285,7 +1285,7 @@
             <a:fld id="{B1115196-1C6F-4784-83AC-30756D8F10B3}" type="datetimeFigureOut">
               <a:rPr lang="en-US" smtClean="0"/>
               <a:pPr/>
-              <a:t>11/11/2015</a:t>
+              <a:t>11/12/2015</a:t>
             </a:fld>
             <a:endParaRPr lang="en-US"/>
           </a:p>
@@ -1492,7 +1492,7 @@
             <a:fld id="{B1115196-1C6F-4784-83AC-30756D8F10B3}" type="datetimeFigureOut">
               <a:rPr lang="en-US" smtClean="0"/>
               <a:pPr/>
-              <a:t>11/11/2015</a:t>
+              <a:t>11/12/2015</a:t>
             </a:fld>
             <a:endParaRPr lang="en-US"/>
           </a:p>
@@ -1765,7 +1765,7 @@
             <a:fld id="{B1115196-1C6F-4784-83AC-30756D8F10B3}" type="datetimeFigureOut">
               <a:rPr lang="en-US" smtClean="0"/>
               <a:pPr/>
-              <a:t>11/11/2015</a:t>
+              <a:t>11/12/2015</a:t>
             </a:fld>
             <a:endParaRPr lang="en-US"/>
           </a:p>
@@ -2048,7 +2048,7 @@
             <a:fld id="{B1115196-1C6F-4784-83AC-30756D8F10B3}" type="datetimeFigureOut">
               <a:rPr lang="en-US" smtClean="0"/>
               <a:pPr/>
-              <a:t>11/11/2015</a:t>
+              <a:t>11/12/2015</a:t>
             </a:fld>
             <a:endParaRPr lang="en-US"/>
           </a:p>
@@ -2285,7 +2285,7 @@
             <a:fld id="{B1115196-1C6F-4784-83AC-30756D8F10B3}" type="datetimeFigureOut">
               <a:rPr lang="en-US" smtClean="0"/>
               <a:pPr/>
-              <a:t>11/11/2015</a:t>
+              <a:t>11/12/2015</a:t>
             </a:fld>
             <a:endParaRPr lang="en-US"/>
           </a:p>
@@ -2568,7 +2568,7 @@
             <a:fld id="{B1115196-1C6F-4784-83AC-30756D8F10B3}" type="datetimeFigureOut">
               <a:rPr lang="en-US" smtClean="0"/>
               <a:pPr/>
-              <a:t>11/11/2015</a:t>
+              <a:t>11/12/2015</a:t>
             </a:fld>
             <a:endParaRPr lang="en-US"/>
           </a:p>
@@ -2997,7 +2997,7 @@
             <a:fld id="{B1115196-1C6F-4784-83AC-30756D8F10B3}" type="datetimeFigureOut">
               <a:rPr lang="en-US" smtClean="0"/>
               <a:pPr/>
-              <a:t>11/11/2015</a:t>
+              <a:t>11/12/2015</a:t>
             </a:fld>
             <a:endParaRPr lang="en-US"/>
           </a:p>
@@ -3521,7 +3521,7 @@
             <a:fld id="{B1115196-1C6F-4784-83AC-30756D8F10B3}" type="datetimeFigureOut">
               <a:rPr lang="en-US" smtClean="0"/>
               <a:pPr/>
-              <a:t>11/11/2015</a:t>
+              <a:t>11/12/2015</a:t>
             </a:fld>
             <a:endParaRPr lang="en-US"/>
           </a:p>
@@ -3884,7 +3884,7 @@
             <a:fld id="{B1115196-1C6F-4784-83AC-30756D8F10B3}" type="datetimeFigureOut">
               <a:rPr lang="en-US" smtClean="0"/>
               <a:pPr/>
-              <a:t>11/11/2015</a:t>
+              <a:t>11/12/2015</a:t>
             </a:fld>
             <a:endParaRPr lang="en-US"/>
           </a:p>
@@ -4442,7 +4442,7 @@
             <a:fld id="{B1115196-1C6F-4784-83AC-30756D8F10B3}" type="datetimeFigureOut">
               <a:rPr lang="en-US" smtClean="0"/>
               <a:pPr/>
-              <a:t>11/11/2015</a:t>
+              <a:t>11/12/2015</a:t>
             </a:fld>
             <a:endParaRPr lang="en-US"/>
           </a:p>
@@ -4669,7 +4669,7 @@
             <a:fld id="{B1115196-1C6F-4784-83AC-30756D8F10B3}" type="datetimeFigureOut">
               <a:rPr lang="en-US" smtClean="0"/>
               <a:pPr/>
-              <a:t>11/11/2015</a:t>
+              <a:t>11/12/2015</a:t>
             </a:fld>
             <a:endParaRPr lang="en-US"/>
           </a:p>
@@ -4817,7 +4817,7 @@
             <a:fld id="{B1115196-1C6F-4784-83AC-30756D8F10B3}" type="datetimeFigureOut">
               <a:rPr lang="en-US" smtClean="0"/>
               <a:pPr/>
-              <a:t>11/11/2015</a:t>
+              <a:t>11/12/2015</a:t>
             </a:fld>
             <a:endParaRPr lang="en-US"/>
           </a:p>
@@ -5284,7 +5284,7 @@
             <a:fld id="{B1115196-1C6F-4784-83AC-30756D8F10B3}" type="datetimeFigureOut">
               <a:rPr lang="en-US" smtClean="0"/>
               <a:pPr/>
-              <a:t>11/11/2015</a:t>
+              <a:t>11/12/2015</a:t>
             </a:fld>
             <a:endParaRPr lang="en-US"/>
           </a:p>
@@ -5508,7 +5508,7 @@
             <a:fld id="{B1115196-1C6F-4784-83AC-30756D8F10B3}" type="datetimeFigureOut">
               <a:rPr lang="en-US" smtClean="0"/>
               <a:pPr/>
-              <a:t>11/11/2015</a:t>
+              <a:t>11/12/2015</a:t>
             </a:fld>
             <a:endParaRPr lang="en-US"/>
           </a:p>
@@ -5983,7 +5983,7 @@
               <a:t>Challenge </a:t>
             </a:r>
             <a:r>
-              <a:rPr lang="en-US" altLang="zh-CN" sz="3200" b="1" dirty="0" smtClean="0">
+              <a:rPr lang="en-US" sz="3200" b="1" dirty="0">
                 <a:effectLst>
                   <a:outerShdw blurRad="38100" dist="38100" dir="2700000" algn="tl">
                     <a:srgbClr val="000000">
@@ -5992,7 +5992,7 @@
                   </a:outerShdw>
                 </a:effectLst>
               </a:rPr>
-              <a:t>4</a:t>
+              <a:t>5</a:t>
             </a:r>
             <a:r>
               <a:rPr lang="en-US" sz="3200" b="1" dirty="0" smtClean="0">
@@ -6218,7 +6218,7 @@
     </p:spTree>
     <p:extLst>
       <p:ext uri="{BB962C8B-B14F-4D97-AF65-F5344CB8AC3E}">
-        <p14:creationId xmlns:p14="http://schemas.microsoft.com/office/powerpoint/2010/main" xmlns="" val="714827593"/>
+        <p14:creationId xmlns:p14="http://schemas.microsoft.com/office/powerpoint/2010/main" val="714827593"/>
       </p:ext>
     </p:extLst>
   </p:cSld>
@@ -6389,7 +6389,7 @@
         </p:blipFill>
         <p:spPr bwMode="auto">
           <a:xfrm>
-            <a:off x="474663" y="5347854"/>
+            <a:off x="770515" y="5177474"/>
             <a:ext cx="962891" cy="962891"/>
           </a:xfrm>
           <a:prstGeom prst="rect">
@@ -6415,7 +6415,7 @@
         </p:blipFill>
         <p:spPr bwMode="auto">
           <a:xfrm>
-            <a:off x="7400060" y="2029691"/>
+            <a:off x="7412767" y="2064674"/>
             <a:ext cx="962891" cy="962891"/>
           </a:xfrm>
           <a:prstGeom prst="rect">
@@ -6441,7 +6441,7 @@
         </p:blipFill>
         <p:spPr bwMode="auto">
           <a:xfrm>
-            <a:off x="7400060" y="5347854"/>
+            <a:off x="7429210" y="5177474"/>
             <a:ext cx="962891" cy="962891"/>
           </a:xfrm>
           <a:prstGeom prst="rect">
@@ -6458,7 +6458,7 @@
         </p:nvCxnSpPr>
         <p:spPr>
           <a:xfrm flipV="1">
-            <a:off x="1742354" y="4547127"/>
+            <a:off x="1811767" y="4503579"/>
             <a:ext cx="1721282" cy="1036255"/>
           </a:xfrm>
           <a:prstGeom prst="straightConnector1">
@@ -6491,8 +6491,8 @@
         </p:nvCxnSpPr>
         <p:spPr>
           <a:xfrm flipH="1">
-            <a:off x="5680365" y="2808519"/>
-            <a:ext cx="1719696" cy="823089"/>
+            <a:off x="5429973" y="2782485"/>
+            <a:ext cx="1925642" cy="954288"/>
           </a:xfrm>
           <a:prstGeom prst="straightConnector1">
             <a:avLst/>
@@ -6524,7 +6524,7 @@
         </p:nvCxnSpPr>
         <p:spPr>
           <a:xfrm>
-            <a:off x="1742354" y="2808519"/>
+            <a:off x="1699490" y="2808519"/>
             <a:ext cx="1956810" cy="928254"/>
           </a:xfrm>
           <a:prstGeom prst="straightConnector1">
@@ -6557,7 +6557,7 @@
         </p:nvCxnSpPr>
         <p:spPr>
           <a:xfrm flipH="1" flipV="1">
-            <a:off x="5375564" y="4547128"/>
+            <a:off x="5547591" y="4513184"/>
             <a:ext cx="2024496" cy="1036254"/>
           </a:xfrm>
           <a:prstGeom prst="straightConnector1">
@@ -6589,9 +6589,9 @@
           <p:nvPr/>
         </p:nvSpPr>
         <p:spPr>
-          <a:xfrm>
-            <a:off x="2161304" y="2029691"/>
-            <a:ext cx="1537860" cy="1200329"/>
+          <a:xfrm rot="1461147">
+            <a:off x="2472233" y="2986680"/>
+            <a:ext cx="1537860" cy="369332"/>
           </a:xfrm>
           <a:prstGeom prst="rect">
             <a:avLst/>
@@ -6605,10 +6605,26 @@
           <a:lstStyle/>
           <a:p>
             <a:r>
-              <a:rPr lang="en-IN" dirty="0" smtClean="0"/>
-              <a:t>Beacons sends RSSI value to the coordinator</a:t>
-            </a:r>
-            <a:endParaRPr lang="en-IN" dirty="0"/>
+              <a:rPr lang="en-IN" b="1" dirty="0" smtClean="0">
+                <a:effectLst>
+                  <a:outerShdw blurRad="38100" dist="38100" dir="2700000" algn="tl">
+                    <a:srgbClr val="000000">
+                      <a:alpha val="43137"/>
+                    </a:srgbClr>
+                  </a:outerShdw>
+                </a:effectLst>
+              </a:rPr>
+              <a:t>RSSI</a:t>
+            </a:r>
+            <a:endParaRPr lang="en-IN" b="1" dirty="0">
+              <a:effectLst>
+                <a:outerShdw blurRad="38100" dist="38100" dir="2700000" algn="tl">
+                  <a:srgbClr val="000000">
+                    <a:alpha val="43137"/>
+                  </a:srgbClr>
+                </a:outerShdw>
+              </a:effectLst>
+            </a:endParaRPr>
           </a:p>
         </p:txBody>
       </p:sp>
@@ -6620,7 +6636,7 @@
         </p:nvSpPr>
         <p:spPr>
           <a:xfrm>
-            <a:off x="7400061" y="2992582"/>
+            <a:off x="7273345" y="3272646"/>
             <a:ext cx="1274619" cy="369332"/>
           </a:xfrm>
           <a:prstGeom prst="rect">
@@ -6649,7 +6665,7 @@
         </p:nvSpPr>
         <p:spPr>
           <a:xfrm>
-            <a:off x="1437554" y="5941413"/>
+            <a:off x="652174" y="6024404"/>
             <a:ext cx="1274619" cy="369332"/>
           </a:xfrm>
           <a:prstGeom prst="rect">
@@ -6678,7 +6694,7 @@
         </p:nvSpPr>
         <p:spPr>
           <a:xfrm>
-            <a:off x="467735" y="2992582"/>
+            <a:off x="658803" y="2894598"/>
             <a:ext cx="1274619" cy="369332"/>
           </a:xfrm>
           <a:prstGeom prst="rect">
@@ -6707,7 +6723,7 @@
         </p:nvSpPr>
         <p:spPr>
           <a:xfrm>
-            <a:off x="6762750" y="6126079"/>
+            <a:off x="7400059" y="6100877"/>
             <a:ext cx="1274619" cy="369332"/>
           </a:xfrm>
           <a:prstGeom prst="rect">
@@ -6736,8 +6752,8 @@
         </p:nvSpPr>
         <p:spPr>
           <a:xfrm>
-            <a:off x="3699164" y="4362462"/>
-            <a:ext cx="1487049" cy="369332"/>
+            <a:off x="3410959" y="4423455"/>
+            <a:ext cx="2187286" cy="646331"/>
           </a:xfrm>
           <a:prstGeom prst="rect">
             <a:avLst/>
@@ -6750,17 +6766,26 @@
           </a:bodyPr>
           <a:lstStyle/>
           <a:p>
-            <a:r>
-              <a:rPr lang="en-IN" dirty="0" smtClean="0"/>
-              <a:t>Coordinator</a:t>
-            </a:r>
+            <a:pPr algn="ctr"/>
+            <a:r>
+              <a:rPr lang="en-IN" b="1" dirty="0" smtClean="0"/>
+              <a:t>Trackable Device</a:t>
+            </a:r>
+          </a:p>
+          <a:p>
+            <a:pPr algn="ctr"/>
+            <a:r>
+              <a:rPr lang="en-IN" b="1" dirty="0" smtClean="0"/>
+              <a:t>(Coordinator)</a:t>
+            </a:r>
+            <a:endParaRPr lang="en-IN" b="1" dirty="0" smtClean="0"/>
           </a:p>
         </p:txBody>
       </p:sp>
     </p:spTree>
     <p:extLst>
       <p:ext uri="{BB962C8B-B14F-4D97-AF65-F5344CB8AC3E}">
-        <p14:creationId xmlns:p14="http://schemas.microsoft.com/office/powerpoint/2010/main" xmlns="" val="3583039675"/>
+        <p14:creationId xmlns:p14="http://schemas.microsoft.com/office/powerpoint/2010/main" val="3583039675"/>
       </p:ext>
     </p:extLst>
   </p:cSld>
@@ -9246,8 +9271,8 @@
         </p:nvSpPr>
         <p:spPr>
           <a:xfrm>
-            <a:off x="2580411" y="4530436"/>
-            <a:ext cx="2535383" cy="1754326"/>
+            <a:off x="2901660" y="4906745"/>
+            <a:ext cx="2535383" cy="646331"/>
           </a:xfrm>
           <a:prstGeom prst="rect">
             <a:avLst/>
@@ -9285,61 +9310,22 @@
           </a:bodyPr>
           <a:lstStyle/>
           <a:p>
+            <a:pPr algn="ctr"/>
+            <a:r>
+              <a:rPr lang="en-IN" dirty="0" err="1" smtClean="0">
+                <a:latin typeface="Arial Black" pitchFamily="34" charset="0"/>
+              </a:rPr>
+              <a:t>kNN</a:t>
+            </a:r>
             <a:r>
               <a:rPr lang="en-IN" dirty="0" smtClean="0">
                 <a:latin typeface="Arial Black" pitchFamily="34" charset="0"/>
               </a:rPr>
-              <a:t>           </a:t>
-            </a:r>
-            <a:r>
-              <a:rPr lang="en-IN" dirty="0" err="1" smtClean="0">
-                <a:latin typeface="Arial Black" pitchFamily="34" charset="0"/>
-              </a:rPr>
-              <a:t>knn</a:t>
-            </a:r>
-            <a:r>
-              <a:rPr lang="en-IN" dirty="0" smtClean="0">
-                <a:latin typeface="Arial Black" pitchFamily="34" charset="0"/>
-              </a:rPr>
-              <a:t>                 </a:t>
-            </a:r>
-          </a:p>
-          <a:p>
-            <a:r>
-              <a:rPr lang="en-IN" dirty="0" smtClean="0">
-                <a:latin typeface="Arial Black" pitchFamily="34" charset="0"/>
-              </a:rPr>
-              <a:t>    ALGORITHM</a:t>
-            </a:r>
-          </a:p>
-          <a:p>
-            <a:r>
-              <a:rPr lang="en-IN" dirty="0" smtClean="0">
-                <a:latin typeface="Arial Black" pitchFamily="34" charset="0"/>
-              </a:rPr>
-              <a:t> (data set of pre-determined </a:t>
-            </a:r>
-            <a:r>
-              <a:rPr lang="en-IN" dirty="0" err="1" smtClean="0">
-                <a:latin typeface="Arial Black" pitchFamily="34" charset="0"/>
-              </a:rPr>
-              <a:t>Rssi</a:t>
-            </a:r>
-            <a:r>
-              <a:rPr lang="en-IN" dirty="0" smtClean="0">
-                <a:latin typeface="Arial Black" pitchFamily="34" charset="0"/>
-              </a:rPr>
-              <a:t>        values) </a:t>
-            </a:r>
-          </a:p>
-          <a:p>
+              <a:t> predicts current location                </a:t>
+            </a:r>
             <a:r>
               <a:rPr lang="en-IN" dirty="0" smtClean="0"/>
-              <a:t> </a:t>
-            </a:r>
-            <a:r>
-              <a:rPr lang="en-IN" dirty="0" smtClean="0"/>
-              <a:t>             </a:t>
+              <a:t>              </a:t>
             </a:r>
             <a:endParaRPr lang="en-IN" dirty="0"/>
           </a:p>
@@ -9353,7 +9339,7 @@
         </p:nvSpPr>
         <p:spPr>
           <a:xfrm>
-            <a:off x="6229352" y="2069068"/>
+            <a:off x="6267446" y="1961292"/>
             <a:ext cx="2133599" cy="369332"/>
           </a:xfrm>
           <a:prstGeom prst="rect">
@@ -9454,28 +9440,42 @@
           </a:bodyPr>
           <a:lstStyle/>
           <a:p>
+            <a:pPr algn="ctr"/>
             <a:r>
               <a:rPr lang="en-IN" dirty="0" smtClean="0">
                 <a:latin typeface="Arial Black" pitchFamily="34" charset="0"/>
               </a:rPr>
-              <a:t>      Node </a:t>
+              <a:t>   </a:t>
             </a:r>
             <a:r>
               <a:rPr lang="en-IN" dirty="0" err="1" smtClean="0">
                 <a:latin typeface="Arial Black" pitchFamily="34" charset="0"/>
               </a:rPr>
-              <a:t>js</a:t>
+              <a:t>RSSI_Server</a:t>
             </a:r>
             <a:endParaRPr lang="en-IN" dirty="0" smtClean="0">
               <a:latin typeface="Arial Black" pitchFamily="34" charset="0"/>
             </a:endParaRPr>
           </a:p>
           <a:p>
+            <a:pPr algn="ctr"/>
             <a:r>
               <a:rPr lang="en-IN" dirty="0" smtClean="0">
                 <a:latin typeface="Arial Black" pitchFamily="34" charset="0"/>
               </a:rPr>
-              <a:t>      Server</a:t>
+              <a:t>(</a:t>
+            </a:r>
+            <a:r>
+              <a:rPr lang="en-IN" dirty="0" err="1" smtClean="0">
+                <a:latin typeface="Arial Black" pitchFamily="34" charset="0"/>
+              </a:rPr>
+              <a:t>NodeJS</a:t>
+            </a:r>
+            <a:r>
+              <a:rPr lang="en-IN" dirty="0" smtClean="0">
+                <a:latin typeface="Arial Black" pitchFamily="34" charset="0"/>
+              </a:rPr>
+              <a:t>)</a:t>
             </a:r>
             <a:endParaRPr lang="en-IN" dirty="0">
               <a:latin typeface="Arial Black" pitchFamily="34" charset="0"/>
@@ -9500,7 +9500,7 @@
         </p:blipFill>
         <p:spPr bwMode="auto">
           <a:xfrm rot="21444548">
-            <a:off x="793744" y="3116491"/>
+            <a:off x="564301" y="3116493"/>
             <a:ext cx="960327" cy="653537"/>
           </a:xfrm>
           <a:prstGeom prst="rect">
@@ -9517,7 +9517,7 @@
         </p:nvSpPr>
         <p:spPr>
           <a:xfrm>
-            <a:off x="637303" y="3978106"/>
+            <a:off x="213011" y="3901569"/>
             <a:ext cx="1565570" cy="369332"/>
           </a:xfrm>
           <a:prstGeom prst="rect">
@@ -9532,7 +9532,7 @@
           <a:lstStyle/>
           <a:p>
             <a:r>
-              <a:rPr lang="en-IN" dirty="0" smtClean="0"/>
+              <a:rPr lang="en-IN" b="1" dirty="0" smtClean="0"/>
               <a:t>Coordinator</a:t>
             </a:r>
           </a:p>
@@ -9545,8 +9545,8 @@
           <p:nvPr/>
         </p:nvCxnSpPr>
         <p:spPr>
-          <a:xfrm>
-            <a:off x="1787237" y="3519055"/>
+          <a:xfrm flipH="1">
+            <a:off x="1644359" y="3519055"/>
             <a:ext cx="1310988" cy="0"/>
           </a:xfrm>
           <a:prstGeom prst="straightConnector1">
@@ -9571,36 +9571,6 @@
           </a:fontRef>
         </p:style>
       </p:cxnSp>
-      <p:sp>
-        <p:nvSpPr>
-          <p:cNvPr id="15" name="TextBox 14"/>
-          <p:cNvSpPr txBox="1"/>
-          <p:nvPr/>
-        </p:nvSpPr>
-        <p:spPr>
-          <a:xfrm>
-            <a:off x="1787237" y="3084730"/>
-            <a:ext cx="1149926" cy="369332"/>
-          </a:xfrm>
-          <a:prstGeom prst="rect">
-            <a:avLst/>
-          </a:prstGeom>
-          <a:noFill/>
-        </p:spPr>
-        <p:txBody>
-          <a:bodyPr wrap="square" rtlCol="0">
-            <a:spAutoFit/>
-          </a:bodyPr>
-          <a:lstStyle/>
-          <a:p>
-            <a:r>
-              <a:rPr lang="en-IN" dirty="0" smtClean="0"/>
-              <a:t>Runs on</a:t>
-            </a:r>
-            <a:endParaRPr lang="en-IN" dirty="0"/>
-          </a:p>
-        </p:txBody>
-      </p:sp>
       <p:cxnSp>
         <p:nvCxnSpPr>
           <p:cNvPr id="17" name="Straight Arrow Connector 16"/>
@@ -9609,8 +9579,8 @@
         </p:nvCxnSpPr>
         <p:spPr>
           <a:xfrm>
-            <a:off x="4128655" y="3741450"/>
-            <a:ext cx="0" cy="739036"/>
+            <a:off x="4107009" y="3901383"/>
+            <a:ext cx="0" cy="870642"/>
           </a:xfrm>
           <a:prstGeom prst="straightConnector1">
             <a:avLst/>
@@ -9642,8 +9612,8 @@
         </p:nvSpPr>
         <p:spPr>
           <a:xfrm>
-            <a:off x="4128655" y="3978106"/>
-            <a:ext cx="1620982" cy="369332"/>
+            <a:off x="4100514" y="3947735"/>
+            <a:ext cx="1620982" cy="646331"/>
           </a:xfrm>
           <a:prstGeom prst="rect">
             <a:avLst/>
@@ -9656,11 +9626,12 @@
           </a:bodyPr>
           <a:lstStyle/>
           <a:p>
-            <a:r>
-              <a:rPr lang="en-IN" dirty="0" smtClean="0"/>
-              <a:t>Makes use of</a:t>
-            </a:r>
-            <a:endParaRPr lang="en-IN" dirty="0"/>
+            <a:pPr algn="ctr"/>
+            <a:r>
+              <a:rPr lang="en-IN" b="1" dirty="0" smtClean="0"/>
+              <a:t>Feed current RSSI reading</a:t>
+            </a:r>
+            <a:endParaRPr lang="en-IN" b="1" dirty="0"/>
           </a:p>
         </p:txBody>
       </p:sp>
@@ -9672,8 +9643,8 @@
         </p:nvCxnSpPr>
         <p:spPr>
           <a:xfrm flipV="1">
-            <a:off x="5115794" y="2438400"/>
-            <a:ext cx="1113558" cy="646330"/>
+            <a:off x="5229225" y="2438400"/>
+            <a:ext cx="1000127" cy="603523"/>
           </a:xfrm>
           <a:prstGeom prst="straightConnector1">
             <a:avLst/>
@@ -9705,8 +9676,8 @@
         </p:nvSpPr>
         <p:spPr>
           <a:xfrm>
-            <a:off x="4608370" y="1976735"/>
-            <a:ext cx="1620982" cy="923330"/>
+            <a:off x="4126488" y="2145958"/>
+            <a:ext cx="1905439" cy="646331"/>
           </a:xfrm>
           <a:prstGeom prst="rect">
             <a:avLst/>
@@ -9719,11 +9690,16 @@
           </a:bodyPr>
           <a:lstStyle/>
           <a:p>
-            <a:r>
-              <a:rPr lang="en-IN" dirty="0" smtClean="0"/>
-              <a:t>Returns coordinates of the map</a:t>
-            </a:r>
-            <a:endParaRPr lang="en-IN" dirty="0"/>
+            <a:pPr algn="ctr"/>
+            <a:r>
+              <a:rPr lang="en-IN" b="1" dirty="0" smtClean="0"/>
+              <a:t>Returns </a:t>
+            </a:r>
+            <a:r>
+              <a:rPr lang="en-IN" b="1" dirty="0" smtClean="0"/>
+              <a:t>location coordinates</a:t>
+            </a:r>
+            <a:endParaRPr lang="en-IN" b="1" dirty="0"/>
           </a:p>
         </p:txBody>
       </p:sp>
@@ -9735,8 +9711,8 @@
         </p:nvSpPr>
         <p:spPr>
           <a:xfrm>
-            <a:off x="6996545" y="2900065"/>
-            <a:ext cx="1620982" cy="1200329"/>
+            <a:off x="6131337" y="2529917"/>
+            <a:ext cx="2269708" cy="646331"/>
           </a:xfrm>
           <a:prstGeom prst="rect">
             <a:avLst/>
@@ -9749,11 +9725,77 @@
           </a:bodyPr>
           <a:lstStyle/>
           <a:p>
-            <a:r>
-              <a:rPr lang="en-IN" dirty="0" smtClean="0"/>
-              <a:t>Webpage display the coordinates on the map.</a:t>
-            </a:r>
-            <a:endParaRPr lang="en-IN" dirty="0"/>
+            <a:pPr algn="ctr"/>
+            <a:r>
+              <a:rPr lang="en-IN" b="1" dirty="0" smtClean="0"/>
+              <a:t>D</a:t>
+            </a:r>
+            <a:r>
+              <a:rPr lang="en-IN" b="1" dirty="0" smtClean="0"/>
+              <a:t>isplays </a:t>
+            </a:r>
+            <a:r>
+              <a:rPr lang="en-IN" b="1" dirty="0" smtClean="0"/>
+              <a:t> </a:t>
+            </a:r>
+            <a:r>
+              <a:rPr lang="en-IN" b="1" dirty="0" smtClean="0"/>
+              <a:t>coordinates </a:t>
+            </a:r>
+            <a:r>
+              <a:rPr lang="en-IN" b="1" dirty="0" smtClean="0"/>
+              <a:t>on the </a:t>
+            </a:r>
+            <a:r>
+              <a:rPr lang="en-IN" b="1" dirty="0" smtClean="0"/>
+              <a:t>map</a:t>
+            </a:r>
+            <a:endParaRPr lang="en-IN" b="1" dirty="0"/>
+          </a:p>
+        </p:txBody>
+      </p:sp>
+      <p:sp>
+        <p:nvSpPr>
+          <p:cNvPr id="3" name="Rectangle 2"/>
+          <p:cNvSpPr/>
+          <p:nvPr/>
+        </p:nvSpPr>
+        <p:spPr>
+          <a:xfrm>
+            <a:off x="1200149" y="3152912"/>
+            <a:ext cx="2036160" cy="800219"/>
+          </a:xfrm>
+          <a:prstGeom prst="rect">
+            <a:avLst/>
+          </a:prstGeom>
+        </p:spPr>
+        <p:txBody>
+          <a:bodyPr wrap="square">
+            <a:spAutoFit/>
+          </a:bodyPr>
+          <a:lstStyle/>
+          <a:p>
+            <a:pPr algn="ctr"/>
+            <a:r>
+              <a:rPr lang="en-US" b="1" dirty="0" smtClean="0"/>
+              <a:t>Reads RSSI</a:t>
+            </a:r>
+          </a:p>
+          <a:p>
+            <a:pPr algn="ctr"/>
+            <a:endParaRPr lang="en-US" sz="1000" b="1" dirty="0" smtClean="0"/>
+          </a:p>
+          <a:p>
+            <a:pPr algn="ctr"/>
+            <a:r>
+              <a:rPr lang="en-US" b="1" dirty="0"/>
+              <a:t>f</a:t>
+            </a:r>
+            <a:r>
+              <a:rPr lang="en-US" b="1" dirty="0" smtClean="0"/>
+              <a:t>rom 4 Beacons</a:t>
+            </a:r>
+            <a:endParaRPr lang="en-US" b="1" dirty="0"/>
           </a:p>
         </p:txBody>
       </p:sp>
@@ -9783,7 +9825,7 @@
                             </p:stCondLst>
                             <p:childTnLst>
                               <p:par>
-                                <p:cTn id="5" presetID="2" presetClass="entr" presetSubtype="4" fill="hold" grpId="0" nodeType="clickEffect">
+                                <p:cTn id="5" presetID="1" presetClass="entr" presetSubtype="0" fill="hold" grpId="0" nodeType="clickEffect">
                                   <p:stCondLst>
                                     <p:cond delay="0"/>
                                   </p:stCondLst>
@@ -9791,6 +9833,123 @@
                                     <p:set>
                                       <p:cBhvr>
                                         <p:cTn id="6" dur="1" fill="hold">
+                                          <p:stCondLst>
+                                            <p:cond delay="0"/>
+                                          </p:stCondLst>
+                                        </p:cTn>
+                                        <p:tgtEl>
+                                          <p:spTgt spid="10"/>
+                                        </p:tgtEl>
+                                        <p:attrNameLst>
+                                          <p:attrName>style.visibility</p:attrName>
+                                        </p:attrNameLst>
+                                      </p:cBhvr>
+                                      <p:to>
+                                        <p:strVal val="visible"/>
+                                      </p:to>
+                                    </p:set>
+                                  </p:childTnLst>
+                                </p:cTn>
+                              </p:par>
+                            </p:childTnLst>
+                          </p:cTn>
+                        </p:par>
+                      </p:childTnLst>
+                    </p:cTn>
+                  </p:par>
+                  <p:par>
+                    <p:cTn id="7" fill="hold">
+                      <p:stCondLst>
+                        <p:cond delay="indefinite"/>
+                      </p:stCondLst>
+                      <p:childTnLst>
+                        <p:par>
+                          <p:cTn id="8" fill="hold">
+                            <p:stCondLst>
+                              <p:cond delay="0"/>
+                            </p:stCondLst>
+                            <p:childTnLst>
+                              <p:par>
+                                <p:cTn id="9" presetID="1" presetClass="entr" presetSubtype="0" fill="hold" grpId="0" nodeType="clickEffect">
+                                  <p:stCondLst>
+                                    <p:cond delay="0"/>
+                                  </p:stCondLst>
+                                  <p:childTnLst>
+                                    <p:set>
+                                      <p:cBhvr>
+                                        <p:cTn id="10" dur="1" fill="hold">
+                                          <p:stCondLst>
+                                            <p:cond delay="0"/>
+                                          </p:stCondLst>
+                                        </p:cTn>
+                                        <p:tgtEl>
+                                          <p:spTgt spid="3"/>
+                                        </p:tgtEl>
+                                        <p:attrNameLst>
+                                          <p:attrName>style.visibility</p:attrName>
+                                        </p:attrNameLst>
+                                      </p:cBhvr>
+                                      <p:to>
+                                        <p:strVal val="visible"/>
+                                      </p:to>
+                                    </p:set>
+                                  </p:childTnLst>
+                                </p:cTn>
+                              </p:par>
+                              <p:par>
+                                <p:cTn id="11" presetID="1" presetClass="entr" presetSubtype="0" fill="hold" nodeType="withEffect">
+                                  <p:stCondLst>
+                                    <p:cond delay="0"/>
+                                  </p:stCondLst>
+                                  <p:childTnLst>
+                                    <p:set>
+                                      <p:cBhvr>
+                                        <p:cTn id="12" dur="1" fill="hold">
+                                          <p:stCondLst>
+                                            <p:cond delay="0"/>
+                                          </p:stCondLst>
+                                        </p:cTn>
+                                        <p:tgtEl>
+                                          <p:spTgt spid="14"/>
+                                        </p:tgtEl>
+                                        <p:attrNameLst>
+                                          <p:attrName>style.visibility</p:attrName>
+                                        </p:attrNameLst>
+                                      </p:cBhvr>
+                                      <p:to>
+                                        <p:strVal val="visible"/>
+                                      </p:to>
+                                    </p:set>
+                                  </p:childTnLst>
+                                </p:cTn>
+                              </p:par>
+                            </p:childTnLst>
+                          </p:cTn>
+                        </p:par>
+                      </p:childTnLst>
+                    </p:cTn>
+                  </p:par>
+                  <p:par>
+                    <p:cTn id="13" fill="hold">
+                      <p:stCondLst>
+                        <p:cond delay="indefinite"/>
+                      </p:stCondLst>
+                      <p:childTnLst>
+                        <p:par>
+                          <p:cTn id="14" fill="hold">
+                            <p:stCondLst>
+                              <p:cond delay="0"/>
+                            </p:stCondLst>
+                            <p:childTnLst>
+                              <p:par>
+                                <p:cTn id="15" presetID="1" presetClass="entr" presetSubtype="0" fill="hold" grpId="0" nodeType="clickEffect">
+                                  <p:stCondLst>
+                                    <p:cond delay="0"/>
+                                  </p:stCondLst>
+                                  <p:childTnLst>
+                                    <p:set>
+                                      <p:cBhvr>
+                                        <p:cTn id="16" dur="1" fill="hold">
                                           <p:stCondLst>
                                             <p:cond delay="0"/>
                                           </p:stCondLst>
@@ -9806,64 +9965,18 @@
                                         <p:strVal val="visible"/>
                                       </p:to>
                                     </p:set>
-                                    <p:anim calcmode="lin" valueType="num">
-                                      <p:cBhvr additive="base">
-                                        <p:cTn id="7" dur="500" fill="hold"/>
-                                        <p:tgtEl>
-                                          <p:spTgt spid="12"/>
-                                        </p:tgtEl>
-                                        <p:attrNameLst>
-                                          <p:attrName>ppt_x</p:attrName>
-                                        </p:attrNameLst>
-                                      </p:cBhvr>
-                                      <p:tavLst>
-                                        <p:tav tm="0">
-                                          <p:val>
-                                            <p:strVal val="#ppt_x"/>
-                                          </p:val>
-                                        </p:tav>
-                                        <p:tav tm="100000">
-                                          <p:val>
-                                            <p:strVal val="#ppt_x"/>
-                                          </p:val>
-                                        </p:tav>
-                                      </p:tavLst>
-                                    </p:anim>
-                                    <p:anim calcmode="lin" valueType="num">
-                                      <p:cBhvr additive="base">
-                                        <p:cTn id="8" dur="500" fill="hold"/>
-                                        <p:tgtEl>
-                                          <p:spTgt spid="12"/>
-                                        </p:tgtEl>
-                                        <p:attrNameLst>
-                                          <p:attrName>ppt_y</p:attrName>
-                                        </p:attrNameLst>
-                                      </p:cBhvr>
-                                      <p:tavLst>
-                                        <p:tav tm="0">
-                                          <p:val>
-                                            <p:strVal val="1+#ppt_h/2"/>
-                                          </p:val>
-                                        </p:tav>
-                                        <p:tav tm="100000">
-                                          <p:val>
-                                            <p:strVal val="#ppt_y"/>
-                                          </p:val>
-                                        </p:tav>
-                                      </p:tavLst>
-                                    </p:anim>
                                   </p:childTnLst>
                                 </p:cTn>
                               </p:par>
                               <p:par>
-                                <p:cTn id="9" presetID="2" presetClass="entr" presetSubtype="4" fill="hold" nodeType="withEffect">
+                                <p:cTn id="17" presetID="1" presetClass="entr" presetSubtype="0" fill="hold" nodeType="withEffect">
                                   <p:stCondLst>
                                     <p:cond delay="0"/>
                                   </p:stCondLst>
                                   <p:childTnLst>
                                     <p:set>
                                       <p:cBhvr>
-                                        <p:cTn id="10" dur="1" fill="hold">
+                                        <p:cTn id="18" dur="1" fill="hold">
                                           <p:stCondLst>
                                             <p:cond delay="0"/>
                                           </p:stCondLst>
@@ -9879,198 +9992,6 @@
                                         <p:strVal val="visible"/>
                                       </p:to>
                                     </p:set>
-                                    <p:anim calcmode="lin" valueType="num">
-                                      <p:cBhvr additive="base">
-                                        <p:cTn id="11" dur="500" fill="hold"/>
-                                        <p:tgtEl>
-                                          <p:spTgt spid="11"/>
-                                        </p:tgtEl>
-                                        <p:attrNameLst>
-                                          <p:attrName>ppt_x</p:attrName>
-                                        </p:attrNameLst>
-                                      </p:cBhvr>
-                                      <p:tavLst>
-                                        <p:tav tm="0">
-                                          <p:val>
-                                            <p:strVal val="#ppt_x"/>
-                                          </p:val>
-                                        </p:tav>
-                                        <p:tav tm="100000">
-                                          <p:val>
-                                            <p:strVal val="#ppt_x"/>
-                                          </p:val>
-                                        </p:tav>
-                                      </p:tavLst>
-                                    </p:anim>
-                                    <p:anim calcmode="lin" valueType="num">
-                                      <p:cBhvr additive="base">
-                                        <p:cTn id="12" dur="500" fill="hold"/>
-                                        <p:tgtEl>
-                                          <p:spTgt spid="11"/>
-                                        </p:tgtEl>
-                                        <p:attrNameLst>
-                                          <p:attrName>ppt_y</p:attrName>
-                                        </p:attrNameLst>
-                                      </p:cBhvr>
-                                      <p:tavLst>
-                                        <p:tav tm="0">
-                                          <p:val>
-                                            <p:strVal val="1+#ppt_h/2"/>
-                                          </p:val>
-                                        </p:tav>
-                                        <p:tav tm="100000">
-                                          <p:val>
-                                            <p:strVal val="#ppt_y"/>
-                                          </p:val>
-                                        </p:tav>
-                                      </p:tavLst>
-                                    </p:anim>
-                                  </p:childTnLst>
-                                </p:cTn>
-                              </p:par>
-                              <p:par>
-                                <p:cTn id="13" presetID="2" presetClass="exit" presetSubtype="4" fill="hold" nodeType="withEffect">
-                                  <p:stCondLst>
-                                    <p:cond delay="0"/>
-                                  </p:stCondLst>
-                                  <p:childTnLst>
-                                    <p:anim calcmode="lin" valueType="num">
-                                      <p:cBhvr additive="base">
-                                        <p:cTn id="14" dur="500"/>
-                                        <p:tgtEl>
-                                          <p:spTgt spid="11"/>
-                                        </p:tgtEl>
-                                        <p:attrNameLst>
-                                          <p:attrName>ppt_x</p:attrName>
-                                        </p:attrNameLst>
-                                      </p:cBhvr>
-                                      <p:tavLst>
-                                        <p:tav tm="0">
-                                          <p:val>
-                                            <p:strVal val="ppt_x"/>
-                                          </p:val>
-                                        </p:tav>
-                                        <p:tav tm="100000">
-                                          <p:val>
-                                            <p:strVal val="ppt_x"/>
-                                          </p:val>
-                                        </p:tav>
-                                      </p:tavLst>
-                                    </p:anim>
-                                    <p:anim calcmode="lin" valueType="num">
-                                      <p:cBhvr additive="base">
-                                        <p:cTn id="15" dur="500"/>
-                                        <p:tgtEl>
-                                          <p:spTgt spid="11"/>
-                                        </p:tgtEl>
-                                        <p:attrNameLst>
-                                          <p:attrName>ppt_y</p:attrName>
-                                        </p:attrNameLst>
-                                      </p:cBhvr>
-                                      <p:tavLst>
-                                        <p:tav tm="0">
-                                          <p:val>
-                                            <p:strVal val="ppt_y"/>
-                                          </p:val>
-                                        </p:tav>
-                                        <p:tav tm="100000">
-                                          <p:val>
-                                            <p:strVal val="1+ppt_h/2"/>
-                                          </p:val>
-                                        </p:tav>
-                                      </p:tavLst>
-                                    </p:anim>
-                                    <p:set>
-                                      <p:cBhvr>
-                                        <p:cTn id="16" dur="1" fill="hold">
-                                          <p:stCondLst>
-                                            <p:cond delay="499"/>
-                                          </p:stCondLst>
-                                        </p:cTn>
-                                        <p:tgtEl>
-                                          <p:spTgt spid="11"/>
-                                        </p:tgtEl>
-                                        <p:attrNameLst>
-                                          <p:attrName>style.visibility</p:attrName>
-                                        </p:attrNameLst>
-                                      </p:cBhvr>
-                                      <p:to>
-                                        <p:strVal val="hidden"/>
-                                      </p:to>
-                                    </p:set>
-                                  </p:childTnLst>
-                                </p:cTn>
-                              </p:par>
-                              <p:par>
-                                <p:cTn id="17" presetID="2" presetClass="exit" presetSubtype="4" fill="hold" grpId="1" nodeType="withEffect">
-                                  <p:stCondLst>
-                                    <p:cond delay="0"/>
-                                  </p:stCondLst>
-                                  <p:childTnLst>
-                                    <p:anim calcmode="lin" valueType="num">
-                                      <p:cBhvr additive="base">
-                                        <p:cTn id="18" dur="500"/>
-                                        <p:tgtEl>
-                                          <p:spTgt spid="12"/>
-                                        </p:tgtEl>
-                                        <p:attrNameLst>
-                                          <p:attrName>ppt_x</p:attrName>
-                                        </p:attrNameLst>
-                                      </p:cBhvr>
-                                      <p:tavLst>
-                                        <p:tav tm="0">
-                                          <p:val>
-                                            <p:strVal val="ppt_x"/>
-                                          </p:val>
-                                        </p:tav>
-                                        <p:tav tm="100000">
-                                          <p:val>
-                                            <p:strVal val="ppt_x"/>
-                                          </p:val>
-                                        </p:tav>
-                                      </p:tavLst>
-                                    </p:anim>
-                                    <p:anim calcmode="lin" valueType="num">
-                                      <p:cBhvr additive="base">
-                                        <p:cTn id="19" dur="500"/>
-                                        <p:tgtEl>
-                                          <p:spTgt spid="12"/>
-                                        </p:tgtEl>
-                                        <p:attrNameLst>
-                                          <p:attrName>ppt_y</p:attrName>
-                                        </p:attrNameLst>
-                                      </p:cBhvr>
-                                      <p:tavLst>
-                                        <p:tav tm="0">
-                                          <p:val>
-                                            <p:strVal val="ppt_y"/>
-                                          </p:val>
-                                        </p:tav>
-                                        <p:tav tm="100000">
-                                          <p:val>
-                                            <p:strVal val="1+ppt_h/2"/>
-                                          </p:val>
-                                        </p:tav>
-                                      </p:tavLst>
-                                    </p:anim>
-                                    <p:set>
-                                      <p:cBhvr>
-                                        <p:cTn id="20" dur="1" fill="hold">
-                                          <p:stCondLst>
-                                            <p:cond delay="499"/>
-                                          </p:stCondLst>
-                                        </p:cTn>
-                                        <p:tgtEl>
-                                          <p:spTgt spid="12"/>
-                                        </p:tgtEl>
-                                        <p:attrNameLst>
-                                          <p:attrName>style.visibility</p:attrName>
-                                        </p:attrNameLst>
-                                      </p:cBhvr>
-                                      <p:to>
-                                        <p:strVal val="hidden"/>
-                                      </p:to>
-                                    </p:set>
                                   </p:childTnLst>
                                 </p:cTn>
                               </p:par>
@@ -10081,32 +10002,32 @@
                     </p:cTn>
                   </p:par>
                   <p:par>
-                    <p:cTn id="21" fill="hold">
+                    <p:cTn id="19" fill="hold">
                       <p:stCondLst>
                         <p:cond delay="indefinite"/>
                       </p:stCondLst>
                       <p:childTnLst>
                         <p:par>
-                          <p:cTn id="22" fill="hold">
+                          <p:cTn id="20" fill="hold">
                             <p:stCondLst>
                               <p:cond delay="0"/>
                             </p:stCondLst>
                             <p:childTnLst>
                               <p:par>
-                                <p:cTn id="23" presetID="2" presetClass="entr" presetSubtype="4" fill="hold" nodeType="clickEffect">
+                                <p:cTn id="21" presetID="1" presetClass="entr" presetSubtype="0" fill="hold" grpId="0" nodeType="clickEffect">
                                   <p:stCondLst>
                                     <p:cond delay="0"/>
                                   </p:stCondLst>
                                   <p:childTnLst>
                                     <p:set>
                                       <p:cBhvr>
-                                        <p:cTn id="24" dur="1" fill="hold">
+                                        <p:cTn id="22" dur="1" fill="hold">
                                           <p:stCondLst>
                                             <p:cond delay="0"/>
                                           </p:stCondLst>
                                         </p:cTn>
                                         <p:tgtEl>
-                                          <p:spTgt spid="11"/>
+                                          <p:spTgt spid="18"/>
                                         </p:tgtEl>
                                         <p:attrNameLst>
                                           <p:attrName>style.visibility</p:attrName>
@@ -10116,410 +10037,18 @@
                                         <p:strVal val="visible"/>
                                       </p:to>
                                     </p:set>
-                                    <p:anim calcmode="lin" valueType="num">
-                                      <p:cBhvr additive="base">
-                                        <p:cTn id="25" dur="500" fill="hold"/>
-                                        <p:tgtEl>
-                                          <p:spTgt spid="11"/>
-                                        </p:tgtEl>
-                                        <p:attrNameLst>
-                                          <p:attrName>ppt_x</p:attrName>
-                                        </p:attrNameLst>
-                                      </p:cBhvr>
-                                      <p:tavLst>
-                                        <p:tav tm="0">
-                                          <p:val>
-                                            <p:strVal val="#ppt_x"/>
-                                          </p:val>
-                                        </p:tav>
-                                        <p:tav tm="100000">
-                                          <p:val>
-                                            <p:strVal val="#ppt_x"/>
-                                          </p:val>
-                                        </p:tav>
-                                      </p:tavLst>
-                                    </p:anim>
-                                    <p:anim calcmode="lin" valueType="num">
-                                      <p:cBhvr additive="base">
-                                        <p:cTn id="26" dur="500" fill="hold"/>
-                                        <p:tgtEl>
-                                          <p:spTgt spid="11"/>
-                                        </p:tgtEl>
-                                        <p:attrNameLst>
-                                          <p:attrName>ppt_y</p:attrName>
-                                        </p:attrNameLst>
-                                      </p:cBhvr>
-                                      <p:tavLst>
-                                        <p:tav tm="0">
-                                          <p:val>
-                                            <p:strVal val="1+#ppt_h/2"/>
-                                          </p:val>
-                                        </p:tav>
-                                        <p:tav tm="100000">
-                                          <p:val>
-                                            <p:strVal val="#ppt_y"/>
-                                          </p:val>
-                                        </p:tav>
-                                      </p:tavLst>
-                                    </p:anim>
                                   </p:childTnLst>
                                 </p:cTn>
                               </p:par>
                               <p:par>
-                                <p:cTn id="27" presetID="2" presetClass="entr" presetSubtype="4" fill="hold" grpId="2" nodeType="withEffect">
+                                <p:cTn id="23" presetID="1" presetClass="entr" presetSubtype="0" fill="hold" nodeType="withEffect">
                                   <p:stCondLst>
                                     <p:cond delay="0"/>
                                   </p:stCondLst>
                                   <p:childTnLst>
                                     <p:set>
                                       <p:cBhvr>
-                                        <p:cTn id="28" dur="1" fill="hold">
-                                          <p:stCondLst>
-                                            <p:cond delay="0"/>
-                                          </p:stCondLst>
-                                        </p:cTn>
-                                        <p:tgtEl>
-                                          <p:spTgt spid="12"/>
-                                        </p:tgtEl>
-                                        <p:attrNameLst>
-                                          <p:attrName>style.visibility</p:attrName>
-                                        </p:attrNameLst>
-                                      </p:cBhvr>
-                                      <p:to>
-                                        <p:strVal val="visible"/>
-                                      </p:to>
-                                    </p:set>
-                                    <p:anim calcmode="lin" valueType="num">
-                                      <p:cBhvr additive="base">
-                                        <p:cTn id="29" dur="500" fill="hold"/>
-                                        <p:tgtEl>
-                                          <p:spTgt spid="12"/>
-                                        </p:tgtEl>
-                                        <p:attrNameLst>
-                                          <p:attrName>ppt_x</p:attrName>
-                                        </p:attrNameLst>
-                                      </p:cBhvr>
-                                      <p:tavLst>
-                                        <p:tav tm="0">
-                                          <p:val>
-                                            <p:strVal val="#ppt_x"/>
-                                          </p:val>
-                                        </p:tav>
-                                        <p:tav tm="100000">
-                                          <p:val>
-                                            <p:strVal val="#ppt_x"/>
-                                          </p:val>
-                                        </p:tav>
-                                      </p:tavLst>
-                                    </p:anim>
-                                    <p:anim calcmode="lin" valueType="num">
-                                      <p:cBhvr additive="base">
-                                        <p:cTn id="30" dur="500" fill="hold"/>
-                                        <p:tgtEl>
-                                          <p:spTgt spid="12"/>
-                                        </p:tgtEl>
-                                        <p:attrNameLst>
-                                          <p:attrName>ppt_y</p:attrName>
-                                        </p:attrNameLst>
-                                      </p:cBhvr>
-                                      <p:tavLst>
-                                        <p:tav tm="0">
-                                          <p:val>
-                                            <p:strVal val="1+#ppt_h/2"/>
-                                          </p:val>
-                                        </p:tav>
-                                        <p:tav tm="100000">
-                                          <p:val>
-                                            <p:strVal val="#ppt_y"/>
-                                          </p:val>
-                                        </p:tav>
-                                      </p:tavLst>
-                                    </p:anim>
-                                  </p:childTnLst>
-                                </p:cTn>
-                              </p:par>
-                            </p:childTnLst>
-                          </p:cTn>
-                        </p:par>
-                      </p:childTnLst>
-                    </p:cTn>
-                  </p:par>
-                  <p:par>
-                    <p:cTn id="31" fill="hold">
-                      <p:stCondLst>
-                        <p:cond delay="indefinite"/>
-                      </p:stCondLst>
-                      <p:childTnLst>
-                        <p:par>
-                          <p:cTn id="32" fill="hold">
-                            <p:stCondLst>
-                              <p:cond delay="0"/>
-                            </p:stCondLst>
-                            <p:childTnLst>
-                              <p:par>
-                                <p:cTn id="33" presetID="2" presetClass="entr" presetSubtype="4" fill="hold" nodeType="clickEffect">
-                                  <p:stCondLst>
-                                    <p:cond delay="0"/>
-                                  </p:stCondLst>
-                                  <p:childTnLst>
-                                    <p:set>
-                                      <p:cBhvr>
-                                        <p:cTn id="34" dur="1" fill="hold">
-                                          <p:stCondLst>
-                                            <p:cond delay="0"/>
-                                          </p:stCondLst>
-                                        </p:cTn>
-                                        <p:tgtEl>
-                                          <p:spTgt spid="14"/>
-                                        </p:tgtEl>
-                                        <p:attrNameLst>
-                                          <p:attrName>style.visibility</p:attrName>
-                                        </p:attrNameLst>
-                                      </p:cBhvr>
-                                      <p:to>
-                                        <p:strVal val="visible"/>
-                                      </p:to>
-                                    </p:set>
-                                    <p:anim calcmode="lin" valueType="num">
-                                      <p:cBhvr additive="base">
-                                        <p:cTn id="35" dur="500" fill="hold"/>
-                                        <p:tgtEl>
-                                          <p:spTgt spid="14"/>
-                                        </p:tgtEl>
-                                        <p:attrNameLst>
-                                          <p:attrName>ppt_x</p:attrName>
-                                        </p:attrNameLst>
-                                      </p:cBhvr>
-                                      <p:tavLst>
-                                        <p:tav tm="0">
-                                          <p:val>
-                                            <p:strVal val="#ppt_x"/>
-                                          </p:val>
-                                        </p:tav>
-                                        <p:tav tm="100000">
-                                          <p:val>
-                                            <p:strVal val="#ppt_x"/>
-                                          </p:val>
-                                        </p:tav>
-                                      </p:tavLst>
-                                    </p:anim>
-                                    <p:anim calcmode="lin" valueType="num">
-                                      <p:cBhvr additive="base">
-                                        <p:cTn id="36" dur="500" fill="hold"/>
-                                        <p:tgtEl>
-                                          <p:spTgt spid="14"/>
-                                        </p:tgtEl>
-                                        <p:attrNameLst>
-                                          <p:attrName>ppt_y</p:attrName>
-                                        </p:attrNameLst>
-                                      </p:cBhvr>
-                                      <p:tavLst>
-                                        <p:tav tm="0">
-                                          <p:val>
-                                            <p:strVal val="1+#ppt_h/2"/>
-                                          </p:val>
-                                        </p:tav>
-                                        <p:tav tm="100000">
-                                          <p:val>
-                                            <p:strVal val="#ppt_y"/>
-                                          </p:val>
-                                        </p:tav>
-                                      </p:tavLst>
-                                    </p:anim>
-                                  </p:childTnLst>
-                                </p:cTn>
-                              </p:par>
-                              <p:par>
-                                <p:cTn id="37" presetID="2" presetClass="entr" presetSubtype="4" fill="hold" grpId="0" nodeType="withEffect">
-                                  <p:stCondLst>
-                                    <p:cond delay="0"/>
-                                  </p:stCondLst>
-                                  <p:childTnLst>
-                                    <p:set>
-                                      <p:cBhvr>
-                                        <p:cTn id="38" dur="1" fill="hold">
-                                          <p:stCondLst>
-                                            <p:cond delay="0"/>
-                                          </p:stCondLst>
-                                        </p:cTn>
-                                        <p:tgtEl>
-                                          <p:spTgt spid="15"/>
-                                        </p:tgtEl>
-                                        <p:attrNameLst>
-                                          <p:attrName>style.visibility</p:attrName>
-                                        </p:attrNameLst>
-                                      </p:cBhvr>
-                                      <p:to>
-                                        <p:strVal val="visible"/>
-                                      </p:to>
-                                    </p:set>
-                                    <p:anim calcmode="lin" valueType="num">
-                                      <p:cBhvr additive="base">
-                                        <p:cTn id="39" dur="500" fill="hold"/>
-                                        <p:tgtEl>
-                                          <p:spTgt spid="15"/>
-                                        </p:tgtEl>
-                                        <p:attrNameLst>
-                                          <p:attrName>ppt_x</p:attrName>
-                                        </p:attrNameLst>
-                                      </p:cBhvr>
-                                      <p:tavLst>
-                                        <p:tav tm="0">
-                                          <p:val>
-                                            <p:strVal val="#ppt_x"/>
-                                          </p:val>
-                                        </p:tav>
-                                        <p:tav tm="100000">
-                                          <p:val>
-                                            <p:strVal val="#ppt_x"/>
-                                          </p:val>
-                                        </p:tav>
-                                      </p:tavLst>
-                                    </p:anim>
-                                    <p:anim calcmode="lin" valueType="num">
-                                      <p:cBhvr additive="base">
-                                        <p:cTn id="40" dur="500" fill="hold"/>
-                                        <p:tgtEl>
-                                          <p:spTgt spid="15"/>
-                                        </p:tgtEl>
-                                        <p:attrNameLst>
-                                          <p:attrName>ppt_y</p:attrName>
-                                        </p:attrNameLst>
-                                      </p:cBhvr>
-                                      <p:tavLst>
-                                        <p:tav tm="0">
-                                          <p:val>
-                                            <p:strVal val="1+#ppt_h/2"/>
-                                          </p:val>
-                                        </p:tav>
-                                        <p:tav tm="100000">
-                                          <p:val>
-                                            <p:strVal val="#ppt_y"/>
-                                          </p:val>
-                                        </p:tav>
-                                      </p:tavLst>
-                                    </p:anim>
-                                  </p:childTnLst>
-                                </p:cTn>
-                              </p:par>
-                            </p:childTnLst>
-                          </p:cTn>
-                        </p:par>
-                      </p:childTnLst>
-                    </p:cTn>
-                  </p:par>
-                  <p:par>
-                    <p:cTn id="41" fill="hold">
-                      <p:stCondLst>
-                        <p:cond delay="indefinite"/>
-                      </p:stCondLst>
-                      <p:childTnLst>
-                        <p:par>
-                          <p:cTn id="42" fill="hold">
-                            <p:stCondLst>
-                              <p:cond delay="0"/>
-                            </p:stCondLst>
-                            <p:childTnLst>
-                              <p:par>
-                                <p:cTn id="43" presetID="2" presetClass="entr" presetSubtype="4" fill="hold" grpId="0" nodeType="clickEffect">
-                                  <p:stCondLst>
-                                    <p:cond delay="0"/>
-                                  </p:stCondLst>
-                                  <p:childTnLst>
-                                    <p:set>
-                                      <p:cBhvr>
-                                        <p:cTn id="44" dur="1" fill="hold">
-                                          <p:stCondLst>
-                                            <p:cond delay="0"/>
-                                          </p:stCondLst>
-                                        </p:cTn>
-                                        <p:tgtEl>
-                                          <p:spTgt spid="10"/>
-                                        </p:tgtEl>
-                                        <p:attrNameLst>
-                                          <p:attrName>style.visibility</p:attrName>
-                                        </p:attrNameLst>
-                                      </p:cBhvr>
-                                      <p:to>
-                                        <p:strVal val="visible"/>
-                                      </p:to>
-                                    </p:set>
-                                    <p:anim calcmode="lin" valueType="num">
-                                      <p:cBhvr additive="base">
-                                        <p:cTn id="45" dur="500" fill="hold"/>
-                                        <p:tgtEl>
-                                          <p:spTgt spid="10"/>
-                                        </p:tgtEl>
-                                        <p:attrNameLst>
-                                          <p:attrName>ppt_x</p:attrName>
-                                        </p:attrNameLst>
-                                      </p:cBhvr>
-                                      <p:tavLst>
-                                        <p:tav tm="0">
-                                          <p:val>
-                                            <p:strVal val="#ppt_x"/>
-                                          </p:val>
-                                        </p:tav>
-                                        <p:tav tm="100000">
-                                          <p:val>
-                                            <p:strVal val="#ppt_x"/>
-                                          </p:val>
-                                        </p:tav>
-                                      </p:tavLst>
-                                    </p:anim>
-                                    <p:anim calcmode="lin" valueType="num">
-                                      <p:cBhvr additive="base">
-                                        <p:cTn id="46" dur="500" fill="hold"/>
-                                        <p:tgtEl>
-                                          <p:spTgt spid="10"/>
-                                        </p:tgtEl>
-                                        <p:attrNameLst>
-                                          <p:attrName>ppt_y</p:attrName>
-                                        </p:attrNameLst>
-                                      </p:cBhvr>
-                                      <p:tavLst>
-                                        <p:tav tm="0">
-                                          <p:val>
-                                            <p:strVal val="1+#ppt_h/2"/>
-                                          </p:val>
-                                        </p:tav>
-                                        <p:tav tm="100000">
-                                          <p:val>
-                                            <p:strVal val="#ppt_y"/>
-                                          </p:val>
-                                        </p:tav>
-                                      </p:tavLst>
-                                    </p:anim>
-                                  </p:childTnLst>
-                                </p:cTn>
-                              </p:par>
-                            </p:childTnLst>
-                          </p:cTn>
-                        </p:par>
-                      </p:childTnLst>
-                    </p:cTn>
-                  </p:par>
-                  <p:par>
-                    <p:cTn id="47" fill="hold">
-                      <p:stCondLst>
-                        <p:cond delay="indefinite"/>
-                      </p:stCondLst>
-                      <p:childTnLst>
-                        <p:par>
-                          <p:cTn id="48" fill="hold">
-                            <p:stCondLst>
-                              <p:cond delay="0"/>
-                            </p:stCondLst>
-                            <p:childTnLst>
-                              <p:par>
-                                <p:cTn id="49" presetID="2" presetClass="entr" presetSubtype="4" fill="hold" nodeType="clickEffect">
-                                  <p:stCondLst>
-                                    <p:cond delay="0"/>
-                                  </p:stCondLst>
-                                  <p:childTnLst>
-                                    <p:set>
-                                      <p:cBhvr>
-                                        <p:cTn id="50" dur="1" fill="hold">
+                                        <p:cTn id="24" dur="1" fill="hold">
                                           <p:stCondLst>
                                             <p:cond delay="0"/>
                                           </p:stCondLst>
@@ -10535,125 +10064,6 @@
                                         <p:strVal val="visible"/>
                                       </p:to>
                                     </p:set>
-                                    <p:anim calcmode="lin" valueType="num">
-                                      <p:cBhvr additive="base">
-                                        <p:cTn id="51" dur="500" fill="hold"/>
-                                        <p:tgtEl>
-                                          <p:spTgt spid="17"/>
-                                        </p:tgtEl>
-                                        <p:attrNameLst>
-                                          <p:attrName>ppt_x</p:attrName>
-                                        </p:attrNameLst>
-                                      </p:cBhvr>
-                                      <p:tavLst>
-                                        <p:tav tm="0">
-                                          <p:val>
-                                            <p:strVal val="#ppt_x"/>
-                                          </p:val>
-                                        </p:tav>
-                                        <p:tav tm="100000">
-                                          <p:val>
-                                            <p:strVal val="#ppt_x"/>
-                                          </p:val>
-                                        </p:tav>
-                                      </p:tavLst>
-                                    </p:anim>
-                                    <p:anim calcmode="lin" valueType="num">
-                                      <p:cBhvr additive="base">
-                                        <p:cTn id="52" dur="500" fill="hold"/>
-                                        <p:tgtEl>
-                                          <p:spTgt spid="17"/>
-                                        </p:tgtEl>
-                                        <p:attrNameLst>
-                                          <p:attrName>ppt_y</p:attrName>
-                                        </p:attrNameLst>
-                                      </p:cBhvr>
-                                      <p:tavLst>
-                                        <p:tav tm="0">
-                                          <p:val>
-                                            <p:strVal val="1+#ppt_h/2"/>
-                                          </p:val>
-                                        </p:tav>
-                                        <p:tav tm="100000">
-                                          <p:val>
-                                            <p:strVal val="#ppt_y"/>
-                                          </p:val>
-                                        </p:tav>
-                                      </p:tavLst>
-                                    </p:anim>
-                                  </p:childTnLst>
-                                </p:cTn>
-                              </p:par>
-                              <p:par>
-                                <p:cTn id="53" presetID="2" presetClass="entr" presetSubtype="4" fill="hold" grpId="0" nodeType="withEffect">
-                                  <p:stCondLst>
-                                    <p:cond delay="0"/>
-                                  </p:stCondLst>
-                                  <p:childTnLst>
-                                    <p:set>
-                                      <p:cBhvr>
-                                        <p:cTn id="54" dur="1" fill="hold">
-                                          <p:stCondLst>
-                                            <p:cond delay="0"/>
-                                          </p:stCondLst>
-                                        </p:cTn>
-                                        <p:tgtEl>
-                                          <p:spTgt spid="18"/>
-                                        </p:tgtEl>
-                                        <p:attrNameLst>
-                                          <p:attrName>style.visibility</p:attrName>
-                                        </p:attrNameLst>
-                                      </p:cBhvr>
-                                      <p:to>
-                                        <p:strVal val="visible"/>
-                                      </p:to>
-                                    </p:set>
-                                    <p:anim calcmode="lin" valueType="num">
-                                      <p:cBhvr additive="base">
-                                        <p:cTn id="55" dur="500" fill="hold"/>
-                                        <p:tgtEl>
-                                          <p:spTgt spid="18"/>
-                                        </p:tgtEl>
-                                        <p:attrNameLst>
-                                          <p:attrName>ppt_x</p:attrName>
-                                        </p:attrNameLst>
-                                      </p:cBhvr>
-                                      <p:tavLst>
-                                        <p:tav tm="0">
-                                          <p:val>
-                                            <p:strVal val="#ppt_x"/>
-                                          </p:val>
-                                        </p:tav>
-                                        <p:tav tm="100000">
-                                          <p:val>
-                                            <p:strVal val="#ppt_x"/>
-                                          </p:val>
-                                        </p:tav>
-                                      </p:tavLst>
-                                    </p:anim>
-                                    <p:anim calcmode="lin" valueType="num">
-                                      <p:cBhvr additive="base">
-                                        <p:cTn id="56" dur="500" fill="hold"/>
-                                        <p:tgtEl>
-                                          <p:spTgt spid="18"/>
-                                        </p:tgtEl>
-                                        <p:attrNameLst>
-                                          <p:attrName>ppt_y</p:attrName>
-                                        </p:attrNameLst>
-                                      </p:cBhvr>
-                                      <p:tavLst>
-                                        <p:tav tm="0">
-                                          <p:val>
-                                            <p:strVal val="1+#ppt_h/2"/>
-                                          </p:val>
-                                        </p:tav>
-                                        <p:tav tm="100000">
-                                          <p:val>
-                                            <p:strVal val="#ppt_y"/>
-                                          </p:val>
-                                        </p:tav>
-                                      </p:tavLst>
-                                    </p:anim>
                                   </p:childTnLst>
                                 </p:cTn>
                               </p:par>
@@ -10664,26 +10074,26 @@
                     </p:cTn>
                   </p:par>
                   <p:par>
-                    <p:cTn id="57" fill="hold">
+                    <p:cTn id="25" fill="hold">
                       <p:stCondLst>
                         <p:cond delay="indefinite"/>
                       </p:stCondLst>
                       <p:childTnLst>
                         <p:par>
-                          <p:cTn id="58" fill="hold">
+                          <p:cTn id="26" fill="hold">
                             <p:stCondLst>
                               <p:cond delay="0"/>
                             </p:stCondLst>
                             <p:childTnLst>
                               <p:par>
-                                <p:cTn id="59" presetID="2" presetClass="entr" presetSubtype="4" fill="hold" grpId="0" nodeType="clickEffect">
+                                <p:cTn id="27" presetID="1" presetClass="entr" presetSubtype="0" fill="hold" grpId="0" nodeType="clickEffect">
                                   <p:stCondLst>
                                     <p:cond delay="0"/>
                                   </p:stCondLst>
                                   <p:childTnLst>
                                     <p:set>
                                       <p:cBhvr>
-                                        <p:cTn id="60" dur="1" fill="hold">
+                                        <p:cTn id="28" dur="1" fill="hold">
                                           <p:stCondLst>
                                             <p:cond delay="0"/>
                                           </p:stCondLst>
@@ -10699,52 +10109,6 @@
                                         <p:strVal val="visible"/>
                                       </p:to>
                                     </p:set>
-                                    <p:anim calcmode="lin" valueType="num">
-                                      <p:cBhvr additive="base">
-                                        <p:cTn id="61" dur="500" fill="hold"/>
-                                        <p:tgtEl>
-                                          <p:spTgt spid="5"/>
-                                        </p:tgtEl>
-                                        <p:attrNameLst>
-                                          <p:attrName>ppt_x</p:attrName>
-                                        </p:attrNameLst>
-                                      </p:cBhvr>
-                                      <p:tavLst>
-                                        <p:tav tm="0">
-                                          <p:val>
-                                            <p:strVal val="#ppt_x"/>
-                                          </p:val>
-                                        </p:tav>
-                                        <p:tav tm="100000">
-                                          <p:val>
-                                            <p:strVal val="#ppt_x"/>
-                                          </p:val>
-                                        </p:tav>
-                                      </p:tavLst>
-                                    </p:anim>
-                                    <p:anim calcmode="lin" valueType="num">
-                                      <p:cBhvr additive="base">
-                                        <p:cTn id="62" dur="500" fill="hold"/>
-                                        <p:tgtEl>
-                                          <p:spTgt spid="5"/>
-                                        </p:tgtEl>
-                                        <p:attrNameLst>
-                                          <p:attrName>ppt_y</p:attrName>
-                                        </p:attrNameLst>
-                                      </p:cBhvr>
-                                      <p:tavLst>
-                                        <p:tav tm="0">
-                                          <p:val>
-                                            <p:strVal val="1+#ppt_h/2"/>
-                                          </p:val>
-                                        </p:tav>
-                                        <p:tav tm="100000">
-                                          <p:val>
-                                            <p:strVal val="#ppt_y"/>
-                                          </p:val>
-                                        </p:tav>
-                                      </p:tavLst>
-                                    </p:anim>
                                   </p:childTnLst>
                                 </p:cTn>
                               </p:par>
@@ -10755,26 +10119,26 @@
                     </p:cTn>
                   </p:par>
                   <p:par>
-                    <p:cTn id="63" fill="hold">
+                    <p:cTn id="29" fill="hold">
                       <p:stCondLst>
                         <p:cond delay="indefinite"/>
                       </p:stCondLst>
                       <p:childTnLst>
                         <p:par>
-                          <p:cTn id="64" fill="hold">
+                          <p:cTn id="30" fill="hold">
                             <p:stCondLst>
                               <p:cond delay="0"/>
                             </p:stCondLst>
                             <p:childTnLst>
                               <p:par>
-                                <p:cTn id="65" presetID="2" presetClass="entr" presetSubtype="4" fill="hold" grpId="0" nodeType="clickEffect">
+                                <p:cTn id="31" presetID="1" presetClass="entr" presetSubtype="0" fill="hold" grpId="0" nodeType="clickEffect">
                                   <p:stCondLst>
                                     <p:cond delay="0"/>
                                   </p:stCondLst>
                                   <p:childTnLst>
                                     <p:set>
                                       <p:cBhvr>
-                                        <p:cTn id="66" dur="1" fill="hold">
+                                        <p:cTn id="32" dur="1" fill="hold">
                                           <p:stCondLst>
                                             <p:cond delay="0"/>
                                           </p:stCondLst>
@@ -10790,64 +10154,18 @@
                                         <p:strVal val="visible"/>
                                       </p:to>
                                     </p:set>
-                                    <p:anim calcmode="lin" valueType="num">
-                                      <p:cBhvr additive="base">
-                                        <p:cTn id="67" dur="500" fill="hold"/>
-                                        <p:tgtEl>
-                                          <p:spTgt spid="22"/>
-                                        </p:tgtEl>
-                                        <p:attrNameLst>
-                                          <p:attrName>ppt_x</p:attrName>
-                                        </p:attrNameLst>
-                                      </p:cBhvr>
-                                      <p:tavLst>
-                                        <p:tav tm="0">
-                                          <p:val>
-                                            <p:strVal val="#ppt_x"/>
-                                          </p:val>
-                                        </p:tav>
-                                        <p:tav tm="100000">
-                                          <p:val>
-                                            <p:strVal val="#ppt_x"/>
-                                          </p:val>
-                                        </p:tav>
-                                      </p:tavLst>
-                                    </p:anim>
-                                    <p:anim calcmode="lin" valueType="num">
-                                      <p:cBhvr additive="base">
-                                        <p:cTn id="68" dur="500" fill="hold"/>
-                                        <p:tgtEl>
-                                          <p:spTgt spid="22"/>
-                                        </p:tgtEl>
-                                        <p:attrNameLst>
-                                          <p:attrName>ppt_y</p:attrName>
-                                        </p:attrNameLst>
-                                      </p:cBhvr>
-                                      <p:tavLst>
-                                        <p:tav tm="0">
-                                          <p:val>
-                                            <p:strVal val="1+#ppt_h/2"/>
-                                          </p:val>
-                                        </p:tav>
-                                        <p:tav tm="100000">
-                                          <p:val>
-                                            <p:strVal val="#ppt_y"/>
-                                          </p:val>
-                                        </p:tav>
-                                      </p:tavLst>
-                                    </p:anim>
                                   </p:childTnLst>
                                 </p:cTn>
                               </p:par>
                               <p:par>
-                                <p:cTn id="69" presetID="2" presetClass="entr" presetSubtype="4" fill="hold" nodeType="withEffect">
+                                <p:cTn id="33" presetID="1" presetClass="entr" presetSubtype="0" fill="hold" nodeType="withEffect">
                                   <p:stCondLst>
                                     <p:cond delay="0"/>
                                   </p:stCondLst>
                                   <p:childTnLst>
                                     <p:set>
                                       <p:cBhvr>
-                                        <p:cTn id="70" dur="1" fill="hold">
+                                        <p:cTn id="34" dur="1" fill="hold">
                                           <p:stCondLst>
                                             <p:cond delay="0"/>
                                           </p:stCondLst>
@@ -10863,64 +10181,36 @@
                                         <p:strVal val="visible"/>
                                       </p:to>
                                     </p:set>
-                                    <p:anim calcmode="lin" valueType="num">
-                                      <p:cBhvr additive="base">
-                                        <p:cTn id="71" dur="500" fill="hold"/>
-                                        <p:tgtEl>
-                                          <p:spTgt spid="20"/>
-                                        </p:tgtEl>
-                                        <p:attrNameLst>
-                                          <p:attrName>ppt_x</p:attrName>
-                                        </p:attrNameLst>
-                                      </p:cBhvr>
-                                      <p:tavLst>
-                                        <p:tav tm="0">
-                                          <p:val>
-                                            <p:strVal val="#ppt_x"/>
-                                          </p:val>
-                                        </p:tav>
-                                        <p:tav tm="100000">
-                                          <p:val>
-                                            <p:strVal val="#ppt_x"/>
-                                          </p:val>
-                                        </p:tav>
-                                      </p:tavLst>
-                                    </p:anim>
-                                    <p:anim calcmode="lin" valueType="num">
-                                      <p:cBhvr additive="base">
-                                        <p:cTn id="72" dur="500" fill="hold"/>
-                                        <p:tgtEl>
-                                          <p:spTgt spid="20"/>
-                                        </p:tgtEl>
-                                        <p:attrNameLst>
-                                          <p:attrName>ppt_y</p:attrName>
-                                        </p:attrNameLst>
-                                      </p:cBhvr>
-                                      <p:tavLst>
-                                        <p:tav tm="0">
-                                          <p:val>
-                                            <p:strVal val="1+#ppt_h/2"/>
-                                          </p:val>
-                                        </p:tav>
-                                        <p:tav tm="100000">
-                                          <p:val>
-                                            <p:strVal val="#ppt_y"/>
-                                          </p:val>
-                                        </p:tav>
-                                      </p:tavLst>
-                                    </p:anim>
                                   </p:childTnLst>
                                 </p:cTn>
                               </p:par>
+                            </p:childTnLst>
+                          </p:cTn>
+                        </p:par>
+                      </p:childTnLst>
+                    </p:cTn>
+                  </p:par>
+                  <p:par>
+                    <p:cTn id="35" fill="hold">
+                      <p:stCondLst>
+                        <p:cond delay="indefinite"/>
+                      </p:stCondLst>
+                      <p:childTnLst>
+                        <p:par>
+                          <p:cTn id="36" fill="hold">
+                            <p:stCondLst>
+                              <p:cond delay="0"/>
+                            </p:stCondLst>
+                            <p:childTnLst>
                               <p:par>
-                                <p:cTn id="73" presetID="2" presetClass="entr" presetSubtype="4" fill="hold" grpId="0" nodeType="withEffect">
+                                <p:cTn id="37" presetID="1" presetClass="entr" presetSubtype="0" fill="hold" grpId="0" nodeType="clickEffect">
                                   <p:stCondLst>
                                     <p:cond delay="0"/>
                                   </p:stCondLst>
                                   <p:childTnLst>
                                     <p:set>
                                       <p:cBhvr>
-                                        <p:cTn id="74" dur="1" fill="hold">
+                                        <p:cTn id="38" dur="1" fill="hold">
                                           <p:stCondLst>
                                             <p:cond delay="0"/>
                                           </p:stCondLst>
@@ -10936,82 +10226,18 @@
                                         <p:strVal val="visible"/>
                                       </p:to>
                                     </p:set>
-                                    <p:anim calcmode="lin" valueType="num">
-                                      <p:cBhvr additive="base">
-                                        <p:cTn id="75" dur="500" fill="hold"/>
-                                        <p:tgtEl>
-                                          <p:spTgt spid="6"/>
-                                        </p:tgtEl>
-                                        <p:attrNameLst>
-                                          <p:attrName>ppt_x</p:attrName>
-                                        </p:attrNameLst>
-                                      </p:cBhvr>
-                                      <p:tavLst>
-                                        <p:tav tm="0">
-                                          <p:val>
-                                            <p:strVal val="#ppt_x"/>
-                                          </p:val>
-                                        </p:tav>
-                                        <p:tav tm="100000">
-                                          <p:val>
-                                            <p:strVal val="#ppt_x"/>
-                                          </p:val>
-                                        </p:tav>
-                                      </p:tavLst>
-                                    </p:anim>
-                                    <p:anim calcmode="lin" valueType="num">
-                                      <p:cBhvr additive="base">
-                                        <p:cTn id="76" dur="500" fill="hold"/>
-                                        <p:tgtEl>
-                                          <p:spTgt spid="6"/>
-                                        </p:tgtEl>
-                                        <p:attrNameLst>
-                                          <p:attrName>ppt_y</p:attrName>
-                                        </p:attrNameLst>
-                                      </p:cBhvr>
-                                      <p:tavLst>
-                                        <p:tav tm="0">
-                                          <p:val>
-                                            <p:strVal val="1+#ppt_h/2"/>
-                                          </p:val>
-                                        </p:tav>
-                                        <p:tav tm="100000">
-                                          <p:val>
-                                            <p:strVal val="#ppt_y"/>
-                                          </p:val>
-                                        </p:tav>
-                                      </p:tavLst>
-                                    </p:anim>
                                   </p:childTnLst>
                                 </p:cTn>
                               </p:par>
-                            </p:childTnLst>
-                          </p:cTn>
-                        </p:par>
-                      </p:childTnLst>
-                    </p:cTn>
-                  </p:par>
-                  <p:par>
-                    <p:cTn id="77" fill="hold">
-                      <p:stCondLst>
-                        <p:cond delay="indefinite"/>
-                      </p:stCondLst>
-                      <p:childTnLst>
-                        <p:par>
-                          <p:cTn id="78" fill="hold">
-                            <p:stCondLst>
-                              <p:cond delay="0"/>
-                            </p:stCondLst>
-                            <p:childTnLst>
                               <p:par>
-                                <p:cTn id="79" presetID="2" presetClass="entr" presetSubtype="4" fill="hold" grpId="0" nodeType="clickEffect">
+                                <p:cTn id="39" presetID="1" presetClass="entr" presetSubtype="0" fill="hold" grpId="0" nodeType="withEffect">
                                   <p:stCondLst>
                                     <p:cond delay="0"/>
                                   </p:stCondLst>
                                   <p:childTnLst>
                                     <p:set>
                                       <p:cBhvr>
-                                        <p:cTn id="80" dur="1" fill="hold">
+                                        <p:cTn id="40" dur="1" fill="hold">
                                           <p:stCondLst>
                                             <p:cond delay="0"/>
                                           </p:stCondLst>
@@ -11027,52 +10253,6 @@
                                         <p:strVal val="visible"/>
                                       </p:to>
                                     </p:set>
-                                    <p:anim calcmode="lin" valueType="num">
-                                      <p:cBhvr additive="base">
-                                        <p:cTn id="81" dur="500" fill="hold"/>
-                                        <p:tgtEl>
-                                          <p:spTgt spid="23"/>
-                                        </p:tgtEl>
-                                        <p:attrNameLst>
-                                          <p:attrName>ppt_x</p:attrName>
-                                        </p:attrNameLst>
-                                      </p:cBhvr>
-                                      <p:tavLst>
-                                        <p:tav tm="0">
-                                          <p:val>
-                                            <p:strVal val="#ppt_x"/>
-                                          </p:val>
-                                        </p:tav>
-                                        <p:tav tm="100000">
-                                          <p:val>
-                                            <p:strVal val="#ppt_x"/>
-                                          </p:val>
-                                        </p:tav>
-                                      </p:tavLst>
-                                    </p:anim>
-                                    <p:anim calcmode="lin" valueType="num">
-                                      <p:cBhvr additive="base">
-                                        <p:cTn id="82" dur="500" fill="hold"/>
-                                        <p:tgtEl>
-                                          <p:spTgt spid="23"/>
-                                        </p:tgtEl>
-                                        <p:attrNameLst>
-                                          <p:attrName>ppt_y</p:attrName>
-                                        </p:attrNameLst>
-                                      </p:cBhvr>
-                                      <p:tavLst>
-                                        <p:tav tm="0">
-                                          <p:val>
-                                            <p:strVal val="1+#ppt_h/2"/>
-                                          </p:val>
-                                        </p:tav>
-                                        <p:tav tm="100000">
-                                          <p:val>
-                                            <p:strVal val="#ppt_y"/>
-                                          </p:val>
-                                        </p:tav>
-                                      </p:tavLst>
-                                    </p:anim>
                                   </p:childTnLst>
                                 </p:cTn>
                               </p:par>
@@ -11108,12 +10288,10 @@
       <p:bldP spid="6" grpId="0" animBg="1"/>
       <p:bldP spid="10" grpId="0" animBg="1"/>
       <p:bldP spid="12" grpId="0"/>
-      <p:bldP spid="12" grpId="1"/>
-      <p:bldP spid="12" grpId="2"/>
-      <p:bldP spid="15" grpId="0"/>
       <p:bldP spid="18" grpId="0"/>
       <p:bldP spid="22" grpId="0"/>
       <p:bldP spid="23" grpId="0"/>
+      <p:bldP spid="3" grpId="0"/>
     </p:bldLst>
   </p:timing>
 </p:sld>
@@ -11185,99 +10363,118 @@
             <p:ph idx="1"/>
           </p:nvPr>
         </p:nvSpPr>
-        <p:spPr/>
+        <p:spPr>
+          <a:xfrm>
+            <a:off x="665161" y="1949824"/>
+            <a:ext cx="7583488" cy="4007224"/>
+          </a:xfrm>
+        </p:spPr>
         <p:txBody>
           <a:bodyPr>
             <a:noAutofit/>
           </a:bodyPr>
           <a:lstStyle/>
           <a:p>
-            <a:pPr>
-              <a:buNone/>
-            </a:pPr>
-            <a:endParaRPr lang="en-US" altLang="zh-CN" sz="2000" b="1" dirty="0"/>
-          </a:p>
-          <a:p>
-            <a:pPr lvl="1">
+            <a:pPr marL="628650" lvl="1" indent="-285750">
               <a:buFont typeface="Wingdings" panose="05000000000000000000" pitchFamily="2" charset="2"/>
               <a:buChar char="§"/>
             </a:pPr>
             <a:r>
               <a:rPr lang="en-US" altLang="zh-CN" sz="1800" b="1" dirty="0" smtClean="0"/>
-              <a:t>1</a:t>
-            </a:r>
-            <a:r>
-              <a:rPr lang="zh-CN" altLang="en-US" sz="1800" b="1" dirty="0" smtClean="0"/>
+              <a:t>Use </a:t>
+            </a:r>
+            <a:r>
+              <a:rPr lang="en-US" altLang="zh-CN" sz="1800" b="1" dirty="0" smtClean="0"/>
+              <a:t>of </a:t>
+            </a:r>
+            <a:r>
+              <a:rPr lang="en-US" altLang="zh-CN" sz="1800" b="1" dirty="0" err="1" smtClean="0"/>
+              <a:t>kNN</a:t>
+            </a:r>
+            <a:r>
+              <a:rPr lang="en-US" altLang="zh-CN" sz="1800" b="1" dirty="0" smtClean="0"/>
               <a:t> </a:t>
             </a:r>
             <a:r>
               <a:rPr lang="en-US" altLang="zh-CN" sz="1800" b="1" dirty="0" smtClean="0"/>
-              <a:t>Use of </a:t>
-            </a:r>
-            <a:r>
-              <a:rPr lang="en-US" altLang="zh-CN" sz="1800" b="1" dirty="0" err="1" smtClean="0"/>
-              <a:t>Knn</a:t>
+              <a:t>vs.</a:t>
             </a:r>
             <a:r>
               <a:rPr lang="en-US" altLang="zh-CN" sz="1800" b="1" dirty="0" smtClean="0"/>
-              <a:t> or </a:t>
-            </a:r>
-            <a:r>
-              <a:rPr lang="en-US" altLang="zh-CN" sz="1800" b="1" dirty="0" err="1" smtClean="0"/>
-              <a:t>Trilateration</a:t>
+              <a:t> </a:t>
             </a:r>
             <a:r>
               <a:rPr lang="en-US" altLang="zh-CN" sz="1800" b="1" dirty="0" smtClean="0"/>
-              <a:t>:</a:t>
+              <a:t>Trilateration:</a:t>
             </a:r>
             <a:endParaRPr lang="en-US" altLang="zh-CN" sz="1800" b="1" dirty="0"/>
           </a:p>
           <a:p>
-            <a:pPr lvl="2">
+            <a:pPr marL="685800" lvl="2" indent="0">
               <a:buNone/>
             </a:pPr>
             <a:r>
-              <a:rPr lang="en-US" altLang="zh-CN" sz="1600" b="1" dirty="0" smtClean="0"/>
-              <a:t>-</a:t>
+              <a:rPr lang="en-US" altLang="zh-CN" sz="1600" dirty="0" smtClean="0"/>
+              <a:t>-  Distance is not a function of s</a:t>
+            </a:r>
+            <a:r>
+              <a:rPr lang="en-US" altLang="zh-CN" sz="1600" dirty="0" smtClean="0"/>
+              <a:t>ignal strength </a:t>
+            </a:r>
+            <a:r>
+              <a:rPr lang="en-US" altLang="zh-CN" sz="1600" dirty="0" smtClean="0">
+                <a:sym typeface="Wingdings" panose="05000000000000000000" pitchFamily="2" charset="2"/>
+              </a:rPr>
+              <a:t> </a:t>
             </a:r>
             <a:r>
               <a:rPr lang="en-US" altLang="zh-CN" sz="1600" dirty="0" err="1" smtClean="0"/>
-              <a:t>knn</a:t>
+              <a:t>kNN</a:t>
             </a:r>
             <a:r>
               <a:rPr lang="en-US" altLang="zh-CN" sz="1600" dirty="0" smtClean="0"/>
-              <a:t> is a better solution for </a:t>
+              <a:t> </a:t>
+            </a:r>
+            <a:r>
+              <a:rPr lang="en-US" altLang="zh-CN" sz="1600" dirty="0" smtClean="0"/>
+              <a:t>is a better solution for </a:t>
+            </a:r>
+            <a:r>
+              <a:rPr lang="en-US" altLang="zh-CN" sz="1600" dirty="0"/>
+              <a:t>	</a:t>
             </a:r>
             <a:r>
               <a:rPr lang="en-US" altLang="zh-CN" sz="1600" dirty="0" err="1" smtClean="0"/>
-              <a:t>Xbee</a:t>
+              <a:t>XBee</a:t>
             </a:r>
             <a:r>
               <a:rPr lang="en-US" altLang="zh-CN" sz="1600" dirty="0" smtClean="0"/>
-              <a:t> like beacons, because the signal  strength is not linearly dependent with the distance.</a:t>
-            </a:r>
-            <a:endParaRPr lang="en-US" altLang="zh-CN" sz="1800" b="1" dirty="0" smtClean="0"/>
-          </a:p>
-          <a:p>
-            <a:pPr lvl="1">
+              <a:t> </a:t>
+            </a:r>
+            <a:r>
+              <a:rPr lang="en-US" altLang="zh-CN" sz="1600" dirty="0" smtClean="0"/>
+              <a:t>like </a:t>
+            </a:r>
+            <a:r>
+              <a:rPr lang="en-US" altLang="zh-CN" sz="1600" dirty="0" smtClean="0"/>
+              <a:t>beacons</a:t>
+            </a:r>
+          </a:p>
+          <a:p>
+            <a:pPr lvl="2">
+              <a:buFontTx/>
+              <a:buChar char="-"/>
+            </a:pPr>
+            <a:endParaRPr lang="en-US" altLang="zh-CN" sz="1600" dirty="0" smtClean="0"/>
+          </a:p>
+          <a:p>
+            <a:pPr marL="571500" lvl="2" indent="-228600">
               <a:buFont typeface="Wingdings" panose="05000000000000000000" pitchFamily="2" charset="2"/>
               <a:buChar char="§"/>
             </a:pPr>
             <a:r>
               <a:rPr lang="en-US" altLang="zh-CN" sz="1800" b="1" dirty="0" smtClean="0"/>
-              <a:t>2</a:t>
-            </a:r>
-            <a:r>
-              <a:rPr lang="zh-CN" altLang="en-US" sz="1800" b="1" dirty="0" smtClean="0"/>
-              <a:t> </a:t>
-            </a:r>
-            <a:r>
-              <a:rPr lang="en-IN" altLang="zh-CN" sz="1800" b="1" dirty="0" smtClean="0"/>
-              <a:t>Choosing a room</a:t>
-            </a:r>
-            <a:r>
-              <a:rPr lang="en-US" altLang="zh-CN" sz="1800" b="1" dirty="0" smtClean="0"/>
-              <a:t>:</a:t>
+              <a:t>Data Collection:</a:t>
             </a:r>
           </a:p>
           <a:p>
@@ -11286,139 +10483,144 @@
             </a:pPr>
             <a:r>
               <a:rPr lang="en-US" altLang="zh-CN" sz="1800" b="1" dirty="0" smtClean="0"/>
-              <a:t> 	-</a:t>
+              <a:t>	</a:t>
+            </a:r>
+            <a:r>
+              <a:rPr lang="en-US" altLang="zh-CN" sz="1800" dirty="0"/>
+              <a:t>- </a:t>
             </a:r>
             <a:r>
               <a:rPr lang="en-US" altLang="zh-CN" sz="1800" dirty="0" smtClean="0"/>
-              <a:t> Less interference with the Signal strength.</a:t>
+              <a:t>Deciding on a location</a:t>
+            </a:r>
+          </a:p>
+          <a:p>
+            <a:pPr marL="857250" lvl="1" indent="-171450">
+              <a:buNone/>
+            </a:pPr>
+            <a:r>
+              <a:rPr lang="en-US" altLang="zh-CN" sz="1800" dirty="0" smtClean="0"/>
+              <a:t>- Creating </a:t>
+            </a:r>
+            <a:r>
+              <a:rPr lang="en-US" altLang="zh-CN" sz="1800" dirty="0"/>
+              <a:t>a </a:t>
+            </a:r>
+            <a:r>
+              <a:rPr lang="en-US" altLang="zh-CN" sz="1800" dirty="0" smtClean="0"/>
+              <a:t>map </a:t>
+            </a:r>
+            <a:r>
+              <a:rPr lang="en-US" altLang="zh-CN" sz="1800" dirty="0"/>
+              <a:t>of the </a:t>
+            </a:r>
+            <a:r>
+              <a:rPr lang="en-US" altLang="zh-CN" sz="1800" dirty="0" smtClean="0"/>
+              <a:t>space and </a:t>
+            </a:r>
+            <a:r>
+              <a:rPr lang="en-US" altLang="zh-CN" sz="1800" dirty="0" smtClean="0"/>
+              <a:t>Dividing the room in 	partitions/coordinates.</a:t>
             </a:r>
           </a:p>
           <a:p>
             <a:pPr lvl="1">
+              <a:buNone/>
+            </a:pPr>
+            <a:r>
+              <a:rPr lang="en-US" altLang="zh-CN" sz="1800" dirty="0" smtClean="0"/>
+              <a:t>	</a:t>
+            </a:r>
+            <a:r>
+              <a:rPr lang="en-US" altLang="zh-CN" sz="1800" dirty="0" smtClean="0"/>
+              <a:t>- Collecting  the data for each partition. </a:t>
+            </a:r>
+          </a:p>
+          <a:p>
+            <a:pPr lvl="1">
+              <a:buNone/>
+            </a:pPr>
+            <a:endParaRPr lang="en-US" altLang="zh-CN" sz="1800" dirty="0"/>
+          </a:p>
+          <a:p>
+            <a:pPr marL="628650" lvl="1" indent="-285750">
               <a:buFont typeface="Wingdings" panose="05000000000000000000" pitchFamily="2" charset="2"/>
               <a:buChar char="§"/>
             </a:pPr>
             <a:r>
-              <a:rPr lang="zh-CN" altLang="en-US" sz="1800" b="1" dirty="0" smtClean="0"/>
-              <a:t> </a:t>
-            </a:r>
-            <a:r>
-              <a:rPr lang="en-IN" altLang="zh-CN" sz="1800" b="1" dirty="0" smtClean="0"/>
-              <a:t>3 </a:t>
-            </a:r>
-            <a:r>
-              <a:rPr lang="en-US" altLang="zh-CN" sz="1800" b="1" dirty="0" smtClean="0"/>
-              <a:t>Dataset for </a:t>
-            </a:r>
-            <a:r>
-              <a:rPr lang="en-US" altLang="zh-CN" sz="1800" b="1" dirty="0" err="1" smtClean="0"/>
-              <a:t>knn</a:t>
-            </a:r>
-            <a:r>
-              <a:rPr lang="en-US" altLang="zh-CN" sz="1800" b="1" dirty="0" smtClean="0"/>
-              <a:t>:</a:t>
-            </a:r>
-          </a:p>
-          <a:p>
-            <a:pPr lvl="1">
+              <a:rPr lang="en-IN" sz="1800" b="1" dirty="0" err="1" smtClean="0"/>
+              <a:t>kNN</a:t>
+            </a:r>
+            <a:r>
+              <a:rPr lang="en-IN" sz="1800" b="1" dirty="0" smtClean="0"/>
+              <a:t> Implementation:</a:t>
+            </a:r>
+          </a:p>
+          <a:p>
+            <a:pPr marL="342900" lvl="1" indent="0">
               <a:buNone/>
             </a:pPr>
             <a:r>
-              <a:rPr lang="en-US" altLang="zh-CN" sz="1800" b="1" dirty="0" smtClean="0"/>
+              <a:rPr lang="en-IN" altLang="zh-CN" sz="1800" b="1" dirty="0"/>
               <a:t>	</a:t>
             </a:r>
             <a:r>
-              <a:rPr lang="en-US" altLang="zh-CN" sz="1800" dirty="0" smtClean="0"/>
-              <a:t>- Dividing the room in coordinates.</a:t>
-            </a:r>
-          </a:p>
-          <a:p>
-            <a:pPr lvl="1">
+              <a:rPr lang="en-IN" altLang="zh-CN" sz="1800" b="1" dirty="0" smtClean="0"/>
+              <a:t>- </a:t>
+            </a:r>
+            <a:r>
+              <a:rPr lang="en-US" altLang="zh-CN" sz="1600" dirty="0" smtClean="0"/>
+              <a:t>Used </a:t>
+            </a:r>
+            <a:r>
+              <a:rPr lang="en-US" altLang="zh-CN" sz="1600" dirty="0" smtClean="0"/>
+              <a:t> a </a:t>
+            </a:r>
+            <a:r>
+              <a:rPr lang="en-US" altLang="zh-CN" sz="1600" dirty="0" err="1" smtClean="0"/>
+              <a:t>NodeJS</a:t>
+            </a:r>
+            <a:r>
+              <a:rPr lang="en-US" altLang="zh-CN" sz="1600" dirty="0" smtClean="0"/>
+              <a:t> </a:t>
+            </a:r>
+            <a:r>
+              <a:rPr lang="en-US" altLang="zh-CN" sz="1600" dirty="0" err="1" smtClean="0"/>
+              <a:t>kNN</a:t>
+            </a:r>
+            <a:r>
+              <a:rPr lang="en-US" altLang="zh-CN" sz="1600" dirty="0" smtClean="0"/>
+              <a:t> </a:t>
+            </a:r>
+            <a:r>
+              <a:rPr lang="en-US" altLang="zh-CN" sz="1600" dirty="0" smtClean="0"/>
+              <a:t>library </a:t>
+            </a:r>
+            <a:r>
+              <a:rPr lang="en-US" altLang="zh-CN" sz="1600" dirty="0" smtClean="0"/>
+              <a:t>to train  the dataset and predict location.</a:t>
+            </a:r>
+          </a:p>
+          <a:p>
+            <a:pPr marL="342900" lvl="1" indent="0">
               <a:buNone/>
             </a:pPr>
             <a:r>
-              <a:rPr lang="en-US" altLang="zh-CN" sz="1800" dirty="0" smtClean="0"/>
+              <a:rPr lang="en-US" altLang="zh-CN" sz="1600" dirty="0"/>
               <a:t>	</a:t>
             </a:r>
             <a:r>
-              <a:rPr lang="en-US" altLang="zh-CN" sz="1800" dirty="0" smtClean="0"/>
-              <a:t>-Preparing the training set for </a:t>
-            </a:r>
-            <a:r>
-              <a:rPr lang="en-US" altLang="zh-CN" sz="1800" dirty="0" err="1" smtClean="0"/>
-              <a:t>knn</a:t>
-            </a:r>
-            <a:r>
-              <a:rPr lang="en-US" altLang="zh-CN" sz="1800" dirty="0" smtClean="0"/>
-              <a:t> algorithm. </a:t>
-            </a:r>
-          </a:p>
-          <a:p>
-            <a:pPr lvl="2">
-              <a:buNone/>
-            </a:pPr>
-            <a:r>
-              <a:rPr lang="en-US" altLang="zh-CN" sz="1600" b="1" dirty="0" smtClean="0"/>
-              <a:t>-</a:t>
-            </a:r>
-            <a:r>
-              <a:rPr lang="en-US" altLang="zh-CN" b="1" dirty="0" smtClean="0"/>
-              <a:t>4</a:t>
-            </a:r>
-            <a:r>
-              <a:rPr lang="zh-CN" altLang="en-US" sz="1800" b="1" dirty="0" smtClean="0"/>
-              <a:t> </a:t>
-            </a:r>
-            <a:r>
-              <a:rPr lang="en-IN" sz="1800" b="1" dirty="0" smtClean="0"/>
-              <a:t>Accessing </a:t>
-            </a:r>
-            <a:r>
-              <a:rPr lang="en-IN" sz="1800" b="1" dirty="0" err="1" smtClean="0"/>
-              <a:t>knn</a:t>
-            </a:r>
-            <a:r>
-              <a:rPr lang="en-IN" sz="1800" b="1" dirty="0" smtClean="0"/>
-              <a:t> training data set from node </a:t>
-            </a:r>
-            <a:r>
-              <a:rPr lang="en-IN" sz="1800" b="1" dirty="0" err="1" smtClean="0"/>
-              <a:t>js</a:t>
-            </a:r>
-            <a:endParaRPr lang="en-US" sz="1800" b="1" dirty="0" smtClean="0"/>
-          </a:p>
-          <a:p>
-            <a:pPr lvl="2">
-              <a:buFont typeface="Corbel" panose="020B0503020204020204" pitchFamily="34" charset="0"/>
-              <a:buChar char="−"/>
-            </a:pPr>
-            <a:r>
               <a:rPr lang="en-US" altLang="zh-CN" sz="1600" dirty="0" smtClean="0"/>
-              <a:t>Using </a:t>
-            </a:r>
-            <a:r>
-              <a:rPr lang="en-US" altLang="zh-CN" sz="1600" dirty="0" err="1" smtClean="0"/>
-              <a:t>knn</a:t>
-            </a:r>
-            <a:r>
-              <a:rPr lang="en-US" altLang="zh-CN" sz="1600" dirty="0" smtClean="0"/>
-              <a:t> library in node </a:t>
-            </a:r>
-            <a:r>
-              <a:rPr lang="en-US" altLang="zh-CN" sz="1600" dirty="0" err="1" smtClean="0"/>
-              <a:t>js</a:t>
-            </a:r>
-            <a:r>
-              <a:rPr lang="en-US" altLang="zh-CN" sz="1600" dirty="0" smtClean="0"/>
-              <a:t> to access the data set.</a:t>
-            </a:r>
+              <a:t>- Can be run on the Raspberry PI</a:t>
+            </a:r>
+            <a:endParaRPr lang="en-US" altLang="zh-CN" sz="1600" dirty="0" smtClean="0"/>
           </a:p>
         </p:txBody>
       </p:sp>
     </p:spTree>
     <p:extLst>
       <p:ext uri="{BB962C8B-B14F-4D97-AF65-F5344CB8AC3E}">
-        <p14:creationId xmlns:p14="http://schemas.microsoft.com/office/powerpoint/2010/main" xmlns="" val="2314508265"/>
+        <p14:creationId xmlns:p14="http://schemas.microsoft.com/office/powerpoint/2010/main" val="2314508265"/>
       </p:ext>
     </p:extLst>
   </p:cSld>
@@ -11554,8 +10756,9 @@
             </a:pPr>
             <a:r>
               <a:rPr lang="en-US" altLang="zh-CN" sz="1800" dirty="0" smtClean="0"/>
-              <a:t>Preparing a data set of RSSI values at various coordinates in the map.</a:t>
-            </a:r>
+              <a:t>Inconsistent outcome when using trilateration method</a:t>
+            </a:r>
+            <a:endParaRPr lang="en-US" altLang="zh-CN" sz="1800" dirty="0" smtClean="0"/>
           </a:p>
           <a:p>
             <a:pPr lvl="1">
@@ -11567,15 +10770,19 @@
             </a:pPr>
             <a:r>
               <a:rPr lang="en-US" altLang="zh-CN" sz="1800" dirty="0" smtClean="0"/>
-              <a:t>Dealing with inconsistent RSSI values from </a:t>
-            </a:r>
-            <a:r>
-              <a:rPr lang="en-US" altLang="zh-CN" sz="1800" dirty="0" err="1" smtClean="0"/>
-              <a:t>Xbees</a:t>
+              <a:t>Collecting </a:t>
             </a:r>
             <a:r>
               <a:rPr lang="en-US" altLang="zh-CN" sz="1800" dirty="0" smtClean="0"/>
-              <a:t>.</a:t>
+              <a:t>RSSI </a:t>
+            </a:r>
+            <a:r>
+              <a:rPr lang="en-US" altLang="zh-CN" sz="1800" dirty="0" smtClean="0"/>
+              <a:t>data for all partitions on </a:t>
+            </a:r>
+            <a:r>
+              <a:rPr lang="en-US" altLang="zh-CN" sz="1800" dirty="0" smtClean="0"/>
+              <a:t>the map.</a:t>
             </a:r>
           </a:p>
           <a:p>
@@ -11588,7 +10795,27 @@
             </a:pPr>
             <a:r>
               <a:rPr lang="en-US" altLang="zh-CN" sz="1800" dirty="0" smtClean="0"/>
-              <a:t>Interference in signal  returned by the beacons.</a:t>
+              <a:t>Handling</a:t>
+            </a:r>
+            <a:r>
+              <a:rPr lang="en-US" altLang="zh-CN" sz="1800" dirty="0" smtClean="0"/>
+              <a:t> </a:t>
+            </a:r>
+            <a:r>
+              <a:rPr lang="en-US" altLang="zh-CN" sz="1800" dirty="0" smtClean="0"/>
+              <a:t>inconsistent RSSI values from </a:t>
+            </a:r>
+            <a:r>
+              <a:rPr lang="en-US" altLang="zh-CN" sz="1800" dirty="0" smtClean="0"/>
+              <a:t>the </a:t>
+            </a:r>
+            <a:r>
+              <a:rPr lang="en-US" altLang="zh-CN" sz="1800" dirty="0" err="1" smtClean="0"/>
+              <a:t>XBees</a:t>
+            </a:r>
+            <a:r>
+              <a:rPr lang="en-US" altLang="zh-CN" sz="1800" dirty="0" smtClean="0"/>
+              <a:t>.</a:t>
             </a:r>
           </a:p>
           <a:p>
@@ -11601,7 +10828,19 @@
             </a:pPr>
             <a:r>
               <a:rPr lang="en-US" altLang="zh-CN" sz="1800" dirty="0" smtClean="0"/>
-              <a:t> Malfunctioning of Beacon 1.</a:t>
+              <a:t>Interference </a:t>
+            </a:r>
+            <a:r>
+              <a:rPr lang="en-US" altLang="zh-CN" sz="1800" dirty="0" smtClean="0"/>
+              <a:t>affecting</a:t>
+            </a:r>
+            <a:r>
+              <a:rPr lang="en-US" altLang="zh-CN" sz="1800" dirty="0" smtClean="0"/>
+              <a:t> signal strength returned </a:t>
+            </a:r>
+            <a:r>
+              <a:rPr lang="en-US" altLang="zh-CN" sz="1800" dirty="0" smtClean="0"/>
+              <a:t>by the beacons.</a:t>
             </a:r>
           </a:p>
           <a:p>
@@ -11614,17 +10853,8 @@
             </a:pPr>
             <a:r>
               <a:rPr lang="en-US" altLang="zh-CN" sz="1800" dirty="0" smtClean="0"/>
-              <a:t>Failure of the </a:t>
-            </a:r>
-            <a:r>
-              <a:rPr lang="en-US" altLang="zh-CN" sz="1800" dirty="0" err="1" smtClean="0"/>
-              <a:t>Trilateration</a:t>
-            </a:r>
-            <a:r>
-              <a:rPr lang="en-US" altLang="zh-CN" sz="1800" dirty="0" smtClean="0"/>
-              <a:t> strategy due to lack of precision from the beacons  </a:t>
-            </a:r>
-            <a:endParaRPr lang="en-US" altLang="zh-CN" sz="1800" dirty="0" smtClean="0"/>
+              <a:t> Malfunctioning of Beacon 1.</a:t>
+            </a:r>
           </a:p>
           <a:p>
             <a:pPr>
@@ -11642,7 +10872,31 @@
                   </a:outerShdw>
                 </a:effectLst>
               </a:rPr>
-              <a:t>Future Improvements:</a:t>
+              <a:t>Future </a:t>
+            </a:r>
+            <a:r>
+              <a:rPr lang="en-US" b="1" dirty="0" smtClean="0">
+                <a:effectLst>
+                  <a:outerShdw blurRad="38100" dist="38100" dir="2700000" algn="tl">
+                    <a:srgbClr val="000000">
+                      <a:alpha val="43137"/>
+                    </a:srgbClr>
+                  </a:outerShdw>
+                </a:effectLst>
+              </a:rPr>
+              <a:t>Improvements</a:t>
+            </a:r>
+            <a:r>
+              <a:rPr lang="en-US" b="1" dirty="0" smtClean="0">
+                <a:effectLst>
+                  <a:outerShdw blurRad="38100" dist="38100" dir="2700000" algn="tl">
+                    <a:srgbClr val="000000">
+                      <a:alpha val="43137"/>
+                    </a:srgbClr>
+                  </a:outerShdw>
+                </a:effectLst>
+              </a:rPr>
+              <a:t>:</a:t>
             </a:r>
             <a:endParaRPr lang="en-US" dirty="0" smtClean="0"/>
           </a:p>
@@ -11656,32 +10910,64 @@
             </a:pPr>
             <a:r>
               <a:rPr lang="en-US" altLang="zh-CN" sz="1800" dirty="0" smtClean="0"/>
-              <a:t>Make use of more data for a better implementation of the </a:t>
-            </a:r>
-            <a:r>
-              <a:rPr lang="en-US" altLang="zh-CN" sz="1800" dirty="0" err="1" smtClean="0"/>
-              <a:t>knn</a:t>
-            </a:r>
-            <a:r>
-              <a:rPr lang="en-US" altLang="zh-CN" sz="1800" dirty="0" smtClean="0"/>
-              <a:t> </a:t>
-            </a:r>
-            <a:r>
-              <a:rPr lang="en-IN" altLang="zh-CN" sz="1800" dirty="0" smtClean="0"/>
-              <a:t>.</a:t>
-            </a:r>
-          </a:p>
-          <a:p>
-            <a:pPr lvl="1">
+              <a:t>Achieve more accurate localization by:</a:t>
+            </a:r>
+          </a:p>
+          <a:p>
+            <a:pPr marL="349250" lvl="1" indent="279400">
               <a:lnSpc>
                 <a:spcPct val="120000"/>
               </a:lnSpc>
-              <a:buFont typeface="Wingdings" panose="05000000000000000000" pitchFamily="2" charset="2"/>
-              <a:buChar char="§"/>
+              <a:buNone/>
             </a:pPr>
             <a:r>
+              <a:rPr lang="en-US" altLang="zh-CN" sz="1800" dirty="0" smtClean="0"/>
+              <a:t>- Collecting more </a:t>
+            </a:r>
+            <a:r>
+              <a:rPr lang="en-US" altLang="zh-CN" sz="1800" dirty="0" err="1" smtClean="0"/>
+              <a:t>kNN</a:t>
+            </a:r>
+            <a:r>
+              <a:rPr lang="en-US" altLang="zh-CN" sz="1800" dirty="0" smtClean="0"/>
+              <a:t> training data</a:t>
+            </a:r>
+            <a:r>
+              <a:rPr lang="en-IN" altLang="zh-CN" sz="1800" dirty="0" smtClean="0"/>
+              <a:t>.</a:t>
+            </a:r>
+            <a:endParaRPr lang="en-IN" altLang="zh-CN" sz="1800" dirty="0" smtClean="0"/>
+          </a:p>
+          <a:p>
+            <a:pPr marL="349250" lvl="1" indent="279400">
+              <a:lnSpc>
+                <a:spcPct val="120000"/>
+              </a:lnSpc>
+              <a:buNone/>
+            </a:pPr>
+            <a:r>
               <a:rPr lang="en-IN" sz="1800" dirty="0" smtClean="0"/>
-              <a:t>Use beacons which have better precision. </a:t>
+              <a:t>- </a:t>
+            </a:r>
+            <a:r>
+              <a:rPr lang="en-IN" sz="1800" dirty="0" smtClean="0"/>
+              <a:t>U</a:t>
+            </a:r>
+            <a:r>
+              <a:rPr lang="en-IN" sz="1800" dirty="0" smtClean="0"/>
+              <a:t>sing more beacons and replacing the malfunctioning </a:t>
+            </a:r>
+            <a:r>
+              <a:rPr lang="en-IN" sz="1800" dirty="0" err="1" smtClean="0"/>
+              <a:t>XBe</a:t>
+            </a:r>
+            <a:r>
+              <a:rPr lang="en-IN" sz="1800" dirty="0" err="1" smtClean="0"/>
+              <a:t>e</a:t>
+            </a:r>
+            <a:r>
+              <a:rPr lang="en-IN" sz="1800" dirty="0" smtClean="0"/>
+              <a:t>.</a:t>
             </a:r>
             <a:endParaRPr lang="en-US" sz="1600" dirty="0"/>
           </a:p>
@@ -11712,7 +10998,7 @@
     </p:spTree>
     <p:extLst>
       <p:ext uri="{BB962C8B-B14F-4D97-AF65-F5344CB8AC3E}">
-        <p14:creationId xmlns:p14="http://schemas.microsoft.com/office/powerpoint/2010/main" xmlns="" val="3507747442"/>
+        <p14:creationId xmlns:p14="http://schemas.microsoft.com/office/powerpoint/2010/main" val="3507747442"/>
       </p:ext>
     </p:extLst>
   </p:cSld>
@@ -11811,7 +11097,7 @@
     </p:spTree>
     <p:extLst>
       <p:ext uri="{BB962C8B-B14F-4D97-AF65-F5344CB8AC3E}">
-        <p14:creationId xmlns:p14="http://schemas.microsoft.com/office/powerpoint/2010/main" xmlns="" val="3804175495"/>
+        <p14:creationId xmlns:p14="http://schemas.microsoft.com/office/powerpoint/2010/main" val="3804175495"/>
       </p:ext>
     </p:extLst>
   </p:cSld>
@@ -12315,7 +11601,7 @@
   <a:extraClrSchemeLst/>
   <a:extLst>
     <a:ext uri="{05A4C25C-085E-4340-85A3-A5531E510DB2}">
-      <thm15:themeFamily xmlns:thm15="http://schemas.microsoft.com/office/thememl/2012/main" xmlns="" name="Office Theme" id="{62F939B6-93AF-4DB8-9C6B-D6C7DFDC589F}" vid="{4A3C46E8-61CC-4603-A589-7422A47A8E4A}"/>
+      <thm15:themeFamily xmlns:thm15="http://schemas.microsoft.com/office/thememl/2012/main" name="Office Theme" id="{62F939B6-93AF-4DB8-9C6B-D6C7DFDC589F}" vid="{4A3C46E8-61CC-4603-A589-7422A47A8E4A}"/>
     </a:ext>
   </a:extLst>
 </a:theme>

</xml_diff>